<commit_message>
1/2 chapter 5 completed
</commit_message>
<xml_diff>
--- a/self-study resources/J8SE1/Chapter 5 - Class Design.pptx
+++ b/self-study resources/J8SE1/Chapter 5 - Class Design.pptx
@@ -5,7 +5,7 @@
     <p:sldMasterId id="2147483648" r:id="rId1"/>
   </p:sldMasterIdLst>
   <p:notesMasterIdLst>
-    <p:notesMasterId r:id="rId19"/>
+    <p:notesMasterId r:id="rId23"/>
   </p:notesMasterIdLst>
   <p:sldIdLst>
     <p:sldId id="256" r:id="rId2"/>
@@ -25,6 +25,10 @@
     <p:sldId id="271" r:id="rId16"/>
     <p:sldId id="272" r:id="rId17"/>
     <p:sldId id="273" r:id="rId18"/>
+    <p:sldId id="274" r:id="rId19"/>
+    <p:sldId id="275" r:id="rId20"/>
+    <p:sldId id="276" r:id="rId21"/>
+    <p:sldId id="277" r:id="rId22"/>
   </p:sldIdLst>
   <p:sldSz cx="12192000" cy="6858000"/>
   <p:notesSz cx="6858000" cy="9144000"/>
@@ -145,6 +149,10 @@
             <p14:sldId id="271"/>
             <p14:sldId id="272"/>
             <p14:sldId id="273"/>
+            <p14:sldId id="274"/>
+            <p14:sldId id="275"/>
+            <p14:sldId id="276"/>
+            <p14:sldId id="277"/>
           </p14:sldIdLst>
         </p14:section>
       </p14:sectionLst>
@@ -699,7 +707,7 @@
           </a:lstStyle>
           <a:p>
             <a:fld id="{9ACA2D73-2532-A640-A667-27AB4D0D333F}" type="datetimeFigureOut">
-              <a:t>2/12/24</a:t>
+              <a:t>3/12/24</a:t>
             </a:fld>
             <a:endParaRPr lang="en-VN"/>
           </a:p>
@@ -1815,6 +1823,327 @@
 </p:notes>
 </file>
 
+<file path=ppt/notesSlides/notesSlide17.xml><?xml version="1.0" encoding="utf-8"?>
+<p:notes xmlns:a="http://schemas.openxmlformats.org/drawingml/2006/main" xmlns:r="http://schemas.openxmlformats.org/officeDocument/2006/relationships" xmlns:p="http://schemas.openxmlformats.org/presentationml/2006/main">
+  <p:cSld>
+    <p:spTree>
+      <p:nvGrpSpPr>
+        <p:cNvPr id="1" name="">
+          <a:extLst>
+            <a:ext uri="{FF2B5EF4-FFF2-40B4-BE49-F238E27FC236}">
+              <a16:creationId xmlns:a16="http://schemas.microsoft.com/office/drawing/2014/main" id="{D1BA896D-2B96-C0EC-F7FF-4E41DA4A5785}"/>
+            </a:ext>
+          </a:extLst>
+        </p:cNvPr>
+        <p:cNvGrpSpPr/>
+        <p:nvPr/>
+      </p:nvGrpSpPr>
+      <p:grpSpPr>
+        <a:xfrm>
+          <a:off x="0" y="0"/>
+          <a:ext cx="0" cy="0"/>
+          <a:chOff x="0" y="0"/>
+          <a:chExt cx="0" cy="0"/>
+        </a:xfrm>
+      </p:grpSpPr>
+      <p:sp>
+        <p:nvSpPr>
+          <p:cNvPr id="2" name="Slide Image Placeholder 1">
+            <a:extLst>
+              <a:ext uri="{FF2B5EF4-FFF2-40B4-BE49-F238E27FC236}">
+                <a16:creationId xmlns:a16="http://schemas.microsoft.com/office/drawing/2014/main" id="{181C5029-5E99-48BE-E1DD-BC5EB0B9C296}"/>
+              </a:ext>
+            </a:extLst>
+          </p:cNvPr>
+          <p:cNvSpPr>
+            <a:spLocks noGrp="1" noRot="1" noChangeAspect="1"/>
+          </p:cNvSpPr>
+          <p:nvPr>
+            <p:ph type="sldImg"/>
+          </p:nvPr>
+        </p:nvSpPr>
+        <p:spPr/>
+      </p:sp>
+      <p:sp>
+        <p:nvSpPr>
+          <p:cNvPr id="3" name="Notes Placeholder 2">
+            <a:extLst>
+              <a:ext uri="{FF2B5EF4-FFF2-40B4-BE49-F238E27FC236}">
+                <a16:creationId xmlns:a16="http://schemas.microsoft.com/office/drawing/2014/main" id="{5B8ED165-2E4B-2288-1F43-9B66D28B64B3}"/>
+              </a:ext>
+            </a:extLst>
+          </p:cNvPr>
+          <p:cNvSpPr>
+            <a:spLocks noGrp="1"/>
+          </p:cNvSpPr>
+          <p:nvPr>
+            <p:ph type="body" idx="1"/>
+          </p:nvPr>
+        </p:nvSpPr>
+        <p:spPr/>
+        <p:txBody>
+          <a:bodyPr/>
+          <a:lstStyle/>
+          <a:p>
+            <a:endParaRPr lang="en-VN"/>
+          </a:p>
+        </p:txBody>
+      </p:sp>
+      <p:sp>
+        <p:nvSpPr>
+          <p:cNvPr id="4" name="Slide Number Placeholder 3">
+            <a:extLst>
+              <a:ext uri="{FF2B5EF4-FFF2-40B4-BE49-F238E27FC236}">
+                <a16:creationId xmlns:a16="http://schemas.microsoft.com/office/drawing/2014/main" id="{2E287D71-3907-4C8D-7BFD-CED457E16087}"/>
+              </a:ext>
+            </a:extLst>
+          </p:cNvPr>
+          <p:cNvSpPr>
+            <a:spLocks noGrp="1"/>
+          </p:cNvSpPr>
+          <p:nvPr>
+            <p:ph type="sldNum" sz="quarter" idx="5"/>
+          </p:nvPr>
+        </p:nvSpPr>
+        <p:spPr/>
+        <p:txBody>
+          <a:bodyPr/>
+          <a:lstStyle/>
+          <a:p>
+            <a:fld id="{576FF3D1-0F45-2240-9B47-75654C02E24A}" type="slidenum">
+              <a:t>18</a:t>
+            </a:fld>
+            <a:endParaRPr lang="en-VN"/>
+          </a:p>
+        </p:txBody>
+      </p:sp>
+    </p:spTree>
+    <p:extLst>
+      <p:ext uri="{BB962C8B-B14F-4D97-AF65-F5344CB8AC3E}">
+        <p14:creationId xmlns:p14="http://schemas.microsoft.com/office/powerpoint/2010/main" val="1251928440"/>
+      </p:ext>
+    </p:extLst>
+  </p:cSld>
+  <p:clrMapOvr>
+    <a:masterClrMapping/>
+  </p:clrMapOvr>
+</p:notes>
+</file>
+
+<file path=ppt/notesSlides/notesSlide18.xml><?xml version="1.0" encoding="utf-8"?>
+<p:notes xmlns:a="http://schemas.openxmlformats.org/drawingml/2006/main" xmlns:r="http://schemas.openxmlformats.org/officeDocument/2006/relationships" xmlns:p="http://schemas.openxmlformats.org/presentationml/2006/main">
+  <p:cSld>
+    <p:spTree>
+      <p:nvGrpSpPr>
+        <p:cNvPr id="1" name="">
+          <a:extLst>
+            <a:ext uri="{FF2B5EF4-FFF2-40B4-BE49-F238E27FC236}">
+              <a16:creationId xmlns:a16="http://schemas.microsoft.com/office/drawing/2014/main" id="{A01E8ABF-E85A-1807-E2A6-026732272FB8}"/>
+            </a:ext>
+          </a:extLst>
+        </p:cNvPr>
+        <p:cNvGrpSpPr/>
+        <p:nvPr/>
+      </p:nvGrpSpPr>
+      <p:grpSpPr>
+        <a:xfrm>
+          <a:off x="0" y="0"/>
+          <a:ext cx="0" cy="0"/>
+          <a:chOff x="0" y="0"/>
+          <a:chExt cx="0" cy="0"/>
+        </a:xfrm>
+      </p:grpSpPr>
+      <p:sp>
+        <p:nvSpPr>
+          <p:cNvPr id="2" name="Slide Image Placeholder 1">
+            <a:extLst>
+              <a:ext uri="{FF2B5EF4-FFF2-40B4-BE49-F238E27FC236}">
+                <a16:creationId xmlns:a16="http://schemas.microsoft.com/office/drawing/2014/main" id="{15D4D140-2620-CA0D-DD3D-637030D58D95}"/>
+              </a:ext>
+            </a:extLst>
+          </p:cNvPr>
+          <p:cNvSpPr>
+            <a:spLocks noGrp="1" noRot="1" noChangeAspect="1"/>
+          </p:cNvSpPr>
+          <p:nvPr>
+            <p:ph type="sldImg"/>
+          </p:nvPr>
+        </p:nvSpPr>
+        <p:spPr/>
+      </p:sp>
+      <p:sp>
+        <p:nvSpPr>
+          <p:cNvPr id="3" name="Notes Placeholder 2">
+            <a:extLst>
+              <a:ext uri="{FF2B5EF4-FFF2-40B4-BE49-F238E27FC236}">
+                <a16:creationId xmlns:a16="http://schemas.microsoft.com/office/drawing/2014/main" id="{978F6450-BD92-E21C-876D-E1956298019B}"/>
+              </a:ext>
+            </a:extLst>
+          </p:cNvPr>
+          <p:cNvSpPr>
+            <a:spLocks noGrp="1"/>
+          </p:cNvSpPr>
+          <p:nvPr>
+            <p:ph type="body" idx="1"/>
+          </p:nvPr>
+        </p:nvSpPr>
+        <p:spPr/>
+        <p:txBody>
+          <a:bodyPr/>
+          <a:lstStyle/>
+          <a:p>
+            <a:endParaRPr lang="en-VN"/>
+          </a:p>
+        </p:txBody>
+      </p:sp>
+      <p:sp>
+        <p:nvSpPr>
+          <p:cNvPr id="4" name="Slide Number Placeholder 3">
+            <a:extLst>
+              <a:ext uri="{FF2B5EF4-FFF2-40B4-BE49-F238E27FC236}">
+                <a16:creationId xmlns:a16="http://schemas.microsoft.com/office/drawing/2014/main" id="{14B2515D-29DB-B51A-FFE8-8B17C8D6D86B}"/>
+              </a:ext>
+            </a:extLst>
+          </p:cNvPr>
+          <p:cNvSpPr>
+            <a:spLocks noGrp="1"/>
+          </p:cNvSpPr>
+          <p:nvPr>
+            <p:ph type="sldNum" sz="quarter" idx="5"/>
+          </p:nvPr>
+        </p:nvSpPr>
+        <p:spPr/>
+        <p:txBody>
+          <a:bodyPr/>
+          <a:lstStyle/>
+          <a:p>
+            <a:fld id="{576FF3D1-0F45-2240-9B47-75654C02E24A}" type="slidenum">
+              <a:t>19</a:t>
+            </a:fld>
+            <a:endParaRPr lang="en-VN"/>
+          </a:p>
+        </p:txBody>
+      </p:sp>
+    </p:spTree>
+    <p:extLst>
+      <p:ext uri="{BB962C8B-B14F-4D97-AF65-F5344CB8AC3E}">
+        <p14:creationId xmlns:p14="http://schemas.microsoft.com/office/powerpoint/2010/main" val="2969448032"/>
+      </p:ext>
+    </p:extLst>
+  </p:cSld>
+  <p:clrMapOvr>
+    <a:masterClrMapping/>
+  </p:clrMapOvr>
+</p:notes>
+</file>
+
+<file path=ppt/notesSlides/notesSlide19.xml><?xml version="1.0" encoding="utf-8"?>
+<p:notes xmlns:a="http://schemas.openxmlformats.org/drawingml/2006/main" xmlns:r="http://schemas.openxmlformats.org/officeDocument/2006/relationships" xmlns:p="http://schemas.openxmlformats.org/presentationml/2006/main">
+  <p:cSld>
+    <p:spTree>
+      <p:nvGrpSpPr>
+        <p:cNvPr id="1" name="">
+          <a:extLst>
+            <a:ext uri="{FF2B5EF4-FFF2-40B4-BE49-F238E27FC236}">
+              <a16:creationId xmlns:a16="http://schemas.microsoft.com/office/drawing/2014/main" id="{BC8ADFC5-AAD7-A931-17BE-03C47DB4B33E}"/>
+            </a:ext>
+          </a:extLst>
+        </p:cNvPr>
+        <p:cNvGrpSpPr/>
+        <p:nvPr/>
+      </p:nvGrpSpPr>
+      <p:grpSpPr>
+        <a:xfrm>
+          <a:off x="0" y="0"/>
+          <a:ext cx="0" cy="0"/>
+          <a:chOff x="0" y="0"/>
+          <a:chExt cx="0" cy="0"/>
+        </a:xfrm>
+      </p:grpSpPr>
+      <p:sp>
+        <p:nvSpPr>
+          <p:cNvPr id="2" name="Slide Image Placeholder 1">
+            <a:extLst>
+              <a:ext uri="{FF2B5EF4-FFF2-40B4-BE49-F238E27FC236}">
+                <a16:creationId xmlns:a16="http://schemas.microsoft.com/office/drawing/2014/main" id="{7F8EF5EE-0C0F-E7D9-BC62-F41D671BE375}"/>
+              </a:ext>
+            </a:extLst>
+          </p:cNvPr>
+          <p:cNvSpPr>
+            <a:spLocks noGrp="1" noRot="1" noChangeAspect="1"/>
+          </p:cNvSpPr>
+          <p:nvPr>
+            <p:ph type="sldImg"/>
+          </p:nvPr>
+        </p:nvSpPr>
+        <p:spPr/>
+      </p:sp>
+      <p:sp>
+        <p:nvSpPr>
+          <p:cNvPr id="3" name="Notes Placeholder 2">
+            <a:extLst>
+              <a:ext uri="{FF2B5EF4-FFF2-40B4-BE49-F238E27FC236}">
+                <a16:creationId xmlns:a16="http://schemas.microsoft.com/office/drawing/2014/main" id="{909FCDAA-8386-DF77-DD2F-CDE8CDDD3011}"/>
+              </a:ext>
+            </a:extLst>
+          </p:cNvPr>
+          <p:cNvSpPr>
+            <a:spLocks noGrp="1"/>
+          </p:cNvSpPr>
+          <p:nvPr>
+            <p:ph type="body" idx="1"/>
+          </p:nvPr>
+        </p:nvSpPr>
+        <p:spPr/>
+        <p:txBody>
+          <a:bodyPr/>
+          <a:lstStyle/>
+          <a:p>
+            <a:endParaRPr lang="en-VN"/>
+          </a:p>
+        </p:txBody>
+      </p:sp>
+      <p:sp>
+        <p:nvSpPr>
+          <p:cNvPr id="4" name="Slide Number Placeholder 3">
+            <a:extLst>
+              <a:ext uri="{FF2B5EF4-FFF2-40B4-BE49-F238E27FC236}">
+                <a16:creationId xmlns:a16="http://schemas.microsoft.com/office/drawing/2014/main" id="{7DDBA783-9467-8436-66DF-02AE54F4AC21}"/>
+              </a:ext>
+            </a:extLst>
+          </p:cNvPr>
+          <p:cNvSpPr>
+            <a:spLocks noGrp="1"/>
+          </p:cNvSpPr>
+          <p:nvPr>
+            <p:ph type="sldNum" sz="quarter" idx="5"/>
+          </p:nvPr>
+        </p:nvSpPr>
+        <p:spPr/>
+        <p:txBody>
+          <a:bodyPr/>
+          <a:lstStyle/>
+          <a:p>
+            <a:fld id="{576FF3D1-0F45-2240-9B47-75654C02E24A}" type="slidenum">
+              <a:t>20</a:t>
+            </a:fld>
+            <a:endParaRPr lang="en-VN"/>
+          </a:p>
+        </p:txBody>
+      </p:sp>
+    </p:spTree>
+    <p:extLst>
+      <p:ext uri="{BB962C8B-B14F-4D97-AF65-F5344CB8AC3E}">
+        <p14:creationId xmlns:p14="http://schemas.microsoft.com/office/powerpoint/2010/main" val="3120857228"/>
+      </p:ext>
+    </p:extLst>
+  </p:cSld>
+  <p:clrMapOvr>
+    <a:masterClrMapping/>
+  </p:clrMapOvr>
+</p:notes>
+</file>
+
 <file path=ppt/notesSlides/notesSlide2.xml><?xml version="1.0" encoding="utf-8"?>
 <p:notes xmlns:a="http://schemas.openxmlformats.org/drawingml/2006/main" xmlns:r="http://schemas.openxmlformats.org/officeDocument/2006/relationships" xmlns:p="http://schemas.openxmlformats.org/presentationml/2006/main">
   <p:cSld>
@@ -1913,6 +2242,113 @@
     <p:extLst>
       <p:ext uri="{BB962C8B-B14F-4D97-AF65-F5344CB8AC3E}">
         <p14:creationId xmlns:p14="http://schemas.microsoft.com/office/powerpoint/2010/main" val="2449991491"/>
+      </p:ext>
+    </p:extLst>
+  </p:cSld>
+  <p:clrMapOvr>
+    <a:masterClrMapping/>
+  </p:clrMapOvr>
+</p:notes>
+</file>
+
+<file path=ppt/notesSlides/notesSlide20.xml><?xml version="1.0" encoding="utf-8"?>
+<p:notes xmlns:a="http://schemas.openxmlformats.org/drawingml/2006/main" xmlns:r="http://schemas.openxmlformats.org/officeDocument/2006/relationships" xmlns:p="http://schemas.openxmlformats.org/presentationml/2006/main">
+  <p:cSld>
+    <p:spTree>
+      <p:nvGrpSpPr>
+        <p:cNvPr id="1" name="">
+          <a:extLst>
+            <a:ext uri="{FF2B5EF4-FFF2-40B4-BE49-F238E27FC236}">
+              <a16:creationId xmlns:a16="http://schemas.microsoft.com/office/drawing/2014/main" id="{82ED929E-DA37-CB43-1E3F-60AB812C01C7}"/>
+            </a:ext>
+          </a:extLst>
+        </p:cNvPr>
+        <p:cNvGrpSpPr/>
+        <p:nvPr/>
+      </p:nvGrpSpPr>
+      <p:grpSpPr>
+        <a:xfrm>
+          <a:off x="0" y="0"/>
+          <a:ext cx="0" cy="0"/>
+          <a:chOff x="0" y="0"/>
+          <a:chExt cx="0" cy="0"/>
+        </a:xfrm>
+      </p:grpSpPr>
+      <p:sp>
+        <p:nvSpPr>
+          <p:cNvPr id="2" name="Slide Image Placeholder 1">
+            <a:extLst>
+              <a:ext uri="{FF2B5EF4-FFF2-40B4-BE49-F238E27FC236}">
+                <a16:creationId xmlns:a16="http://schemas.microsoft.com/office/drawing/2014/main" id="{90BD5011-BE0A-5318-D647-93E172AFD61C}"/>
+              </a:ext>
+            </a:extLst>
+          </p:cNvPr>
+          <p:cNvSpPr>
+            <a:spLocks noGrp="1" noRot="1" noChangeAspect="1"/>
+          </p:cNvSpPr>
+          <p:nvPr>
+            <p:ph type="sldImg"/>
+          </p:nvPr>
+        </p:nvSpPr>
+        <p:spPr/>
+      </p:sp>
+      <p:sp>
+        <p:nvSpPr>
+          <p:cNvPr id="3" name="Notes Placeholder 2">
+            <a:extLst>
+              <a:ext uri="{FF2B5EF4-FFF2-40B4-BE49-F238E27FC236}">
+                <a16:creationId xmlns:a16="http://schemas.microsoft.com/office/drawing/2014/main" id="{3096F54E-1250-B9BE-388E-BB5F4FB41772}"/>
+              </a:ext>
+            </a:extLst>
+          </p:cNvPr>
+          <p:cNvSpPr>
+            <a:spLocks noGrp="1"/>
+          </p:cNvSpPr>
+          <p:nvPr>
+            <p:ph type="body" idx="1"/>
+          </p:nvPr>
+        </p:nvSpPr>
+        <p:spPr/>
+        <p:txBody>
+          <a:bodyPr/>
+          <a:lstStyle/>
+          <a:p>
+            <a:endParaRPr lang="en-VN"/>
+          </a:p>
+        </p:txBody>
+      </p:sp>
+      <p:sp>
+        <p:nvSpPr>
+          <p:cNvPr id="4" name="Slide Number Placeholder 3">
+            <a:extLst>
+              <a:ext uri="{FF2B5EF4-FFF2-40B4-BE49-F238E27FC236}">
+                <a16:creationId xmlns:a16="http://schemas.microsoft.com/office/drawing/2014/main" id="{C753C4B1-98F3-ABDF-4D17-B1095CDBAFA1}"/>
+              </a:ext>
+            </a:extLst>
+          </p:cNvPr>
+          <p:cNvSpPr>
+            <a:spLocks noGrp="1"/>
+          </p:cNvSpPr>
+          <p:nvPr>
+            <p:ph type="sldNum" sz="quarter" idx="5"/>
+          </p:nvPr>
+        </p:nvSpPr>
+        <p:spPr/>
+        <p:txBody>
+          <a:bodyPr/>
+          <a:lstStyle/>
+          <a:p>
+            <a:fld id="{576FF3D1-0F45-2240-9B47-75654C02E24A}" type="slidenum">
+              <a:t>21</a:t>
+            </a:fld>
+            <a:endParaRPr lang="en-VN"/>
+          </a:p>
+        </p:txBody>
+      </p:sp>
+    </p:spTree>
+    <p:extLst>
+      <p:ext uri="{BB962C8B-B14F-4D97-AF65-F5344CB8AC3E}">
+        <p14:creationId xmlns:p14="http://schemas.microsoft.com/office/powerpoint/2010/main" val="3441950994"/>
       </p:ext>
     </p:extLst>
   </p:cSld>
@@ -2818,7 +3254,7 @@
           <a:p>
             <a:fld id="{BAA8DE05-51EE-4692-B197-877FA1DAAAED}" type="datetimeFigureOut">
               <a:rPr lang="en-US" smtClean="0"/>
-              <a:t>12/2/24</a:t>
+              <a:t>12/3/24</a:t>
             </a:fld>
             <a:endParaRPr lang="en-US"/>
           </a:p>
@@ -3016,7 +3452,7 @@
           <a:p>
             <a:fld id="{BAA8DE05-51EE-4692-B197-877FA1DAAAED}" type="datetimeFigureOut">
               <a:rPr lang="en-US" smtClean="0"/>
-              <a:t>12/2/24</a:t>
+              <a:t>12/3/24</a:t>
             </a:fld>
             <a:endParaRPr lang="en-US"/>
           </a:p>
@@ -3224,7 +3660,7 @@
           <a:p>
             <a:fld id="{BAA8DE05-51EE-4692-B197-877FA1DAAAED}" type="datetimeFigureOut">
               <a:rPr lang="en-US" smtClean="0"/>
-              <a:t>12/2/24</a:t>
+              <a:t>12/3/24</a:t>
             </a:fld>
             <a:endParaRPr lang="en-US"/>
           </a:p>
@@ -3422,7 +3858,7 @@
           <a:p>
             <a:fld id="{BAA8DE05-51EE-4692-B197-877FA1DAAAED}" type="datetimeFigureOut">
               <a:rPr lang="en-US" smtClean="0"/>
-              <a:t>12/2/24</a:t>
+              <a:t>12/3/24</a:t>
             </a:fld>
             <a:endParaRPr lang="en-US"/>
           </a:p>
@@ -3697,7 +4133,7 @@
           <a:p>
             <a:fld id="{BAA8DE05-51EE-4692-B197-877FA1DAAAED}" type="datetimeFigureOut">
               <a:rPr lang="en-US" smtClean="0"/>
-              <a:t>12/2/24</a:t>
+              <a:t>12/3/24</a:t>
             </a:fld>
             <a:endParaRPr lang="en-US"/>
           </a:p>
@@ -3962,7 +4398,7 @@
           <a:p>
             <a:fld id="{BAA8DE05-51EE-4692-B197-877FA1DAAAED}" type="datetimeFigureOut">
               <a:rPr lang="en-US" smtClean="0"/>
-              <a:t>12/2/24</a:t>
+              <a:t>12/3/24</a:t>
             </a:fld>
             <a:endParaRPr lang="en-US"/>
           </a:p>
@@ -4374,7 +4810,7 @@
           <a:p>
             <a:fld id="{BAA8DE05-51EE-4692-B197-877FA1DAAAED}" type="datetimeFigureOut">
               <a:rPr lang="en-US" smtClean="0"/>
-              <a:t>12/2/24</a:t>
+              <a:t>12/3/24</a:t>
             </a:fld>
             <a:endParaRPr lang="en-US"/>
           </a:p>
@@ -4515,7 +4951,7 @@
           <a:p>
             <a:fld id="{BAA8DE05-51EE-4692-B197-877FA1DAAAED}" type="datetimeFigureOut">
               <a:rPr lang="en-US" smtClean="0"/>
-              <a:t>12/2/24</a:t>
+              <a:t>12/3/24</a:t>
             </a:fld>
             <a:endParaRPr lang="en-US"/>
           </a:p>
@@ -4628,7 +5064,7 @@
           <a:p>
             <a:fld id="{BAA8DE05-51EE-4692-B197-877FA1DAAAED}" type="datetimeFigureOut">
               <a:rPr lang="en-US" smtClean="0"/>
-              <a:t>12/2/24</a:t>
+              <a:t>12/3/24</a:t>
             </a:fld>
             <a:endParaRPr lang="en-US"/>
           </a:p>
@@ -4939,7 +5375,7 @@
           <a:p>
             <a:fld id="{BAA8DE05-51EE-4692-B197-877FA1DAAAED}" type="datetimeFigureOut">
               <a:rPr lang="en-US" smtClean="0"/>
-              <a:t>12/2/24</a:t>
+              <a:t>12/3/24</a:t>
             </a:fld>
             <a:endParaRPr lang="en-US"/>
           </a:p>
@@ -5227,7 +5663,7 @@
           <a:p>
             <a:fld id="{BAA8DE05-51EE-4692-B197-877FA1DAAAED}" type="datetimeFigureOut">
               <a:rPr lang="en-US" smtClean="0"/>
-              <a:t>12/2/24</a:t>
+              <a:t>12/3/24</a:t>
             </a:fld>
             <a:endParaRPr lang="en-US"/>
           </a:p>
@@ -5468,7 +5904,7 @@
           <a:p>
             <a:fld id="{BAA8DE05-51EE-4692-B197-877FA1DAAAED}" type="datetimeFigureOut">
               <a:rPr lang="en-US" smtClean="0"/>
-              <a:t>12/2/24</a:t>
+              <a:t>12/3/24</a:t>
             </a:fld>
             <a:endParaRPr lang="en-US"/>
           </a:p>
@@ -6750,7 +7186,7 @@
               <a:rPr lang="en-US" sz="1800">
                 <a:sym typeface="Wingdings" pitchFamily="2" charset="2"/>
               </a:rPr>
-              <a:t>+) ...</a:t>
+              <a:t>+) ... (ask question Q5) </a:t>
             </a:r>
           </a:p>
           <a:p>
@@ -10977,6 +11413,1650 @@
 </p:sld>
 </file>
 
+<file path=ppt/slides/slide18.xml><?xml version="1.0" encoding="utf-8"?>
+<p:sld xmlns:a="http://schemas.openxmlformats.org/drawingml/2006/main" xmlns:r="http://schemas.openxmlformats.org/officeDocument/2006/relationships" xmlns:p="http://schemas.openxmlformats.org/presentationml/2006/main">
+  <p:cSld>
+    <p:spTree>
+      <p:nvGrpSpPr>
+        <p:cNvPr id="1" name="">
+          <a:extLst>
+            <a:ext uri="{FF2B5EF4-FFF2-40B4-BE49-F238E27FC236}">
+              <a16:creationId xmlns:a16="http://schemas.microsoft.com/office/drawing/2014/main" id="{A05EBFC1-9744-DB78-26AE-E7208F63000A}"/>
+            </a:ext>
+          </a:extLst>
+        </p:cNvPr>
+        <p:cNvGrpSpPr/>
+        <p:nvPr/>
+      </p:nvGrpSpPr>
+      <p:grpSpPr>
+        <a:xfrm>
+          <a:off x="0" y="0"/>
+          <a:ext cx="0" cy="0"/>
+          <a:chOff x="0" y="0"/>
+          <a:chExt cx="0" cy="0"/>
+        </a:xfrm>
+      </p:grpSpPr>
+      <p:sp>
+        <p:nvSpPr>
+          <p:cNvPr id="3" name="Subtitle 2">
+            <a:extLst>
+              <a:ext uri="{FF2B5EF4-FFF2-40B4-BE49-F238E27FC236}">
+                <a16:creationId xmlns:a16="http://schemas.microsoft.com/office/drawing/2014/main" id="{389192B1-6A6B-3F82-6A74-FD7E31489E78}"/>
+              </a:ext>
+            </a:extLst>
+          </p:cNvPr>
+          <p:cNvSpPr>
+            <a:spLocks noGrp="1"/>
+          </p:cNvSpPr>
+          <p:nvPr>
+            <p:ph type="subTitle" idx="1"/>
+          </p:nvPr>
+        </p:nvSpPr>
+        <p:spPr>
+          <a:xfrm>
+            <a:off x="152399" y="217488"/>
+            <a:ext cx="11223171" cy="303212"/>
+          </a:xfrm>
+        </p:spPr>
+        <p:txBody>
+          <a:bodyPr>
+            <a:normAutofit fontScale="92500" lnSpcReduction="20000"/>
+          </a:bodyPr>
+          <a:lstStyle/>
+          <a:p>
+            <a:r>
+              <a:rPr lang="en-US" sz="1800" b="1"/>
+              <a:t>Creating Abstract class</a:t>
+            </a:r>
+          </a:p>
+        </p:txBody>
+      </p:sp>
+      <p:sp>
+        <p:nvSpPr>
+          <p:cNvPr id="4" name="Subtitle 2">
+            <a:extLst>
+              <a:ext uri="{FF2B5EF4-FFF2-40B4-BE49-F238E27FC236}">
+                <a16:creationId xmlns:a16="http://schemas.microsoft.com/office/drawing/2014/main" id="{BB4003A2-EC33-B69B-1AD9-AB02CA01D855}"/>
+              </a:ext>
+            </a:extLst>
+          </p:cNvPr>
+          <p:cNvSpPr txBox="1">
+            <a:spLocks/>
+          </p:cNvSpPr>
+          <p:nvPr/>
+        </p:nvSpPr>
+        <p:spPr>
+          <a:xfrm>
+            <a:off x="0" y="820738"/>
+            <a:ext cx="12192000" cy="6037262"/>
+          </a:xfrm>
+          <a:prstGeom prst="rect">
+            <a:avLst/>
+          </a:prstGeom>
+        </p:spPr>
+        <p:txBody>
+          <a:bodyPr vert="horz" lIns="91440" tIns="45720" rIns="91440" bIns="45720" rtlCol="0">
+            <a:normAutofit/>
+          </a:bodyPr>
+          <a:lstStyle>
+            <a:lvl1pPr marL="0" indent="0" algn="ctr" defTabSz="914400" rtl="0" eaLnBrk="1" latinLnBrk="0" hangingPunct="1">
+              <a:lnSpc>
+                <a:spcPct val="90000"/>
+              </a:lnSpc>
+              <a:spcBef>
+                <a:spcPts val="1000"/>
+              </a:spcBef>
+              <a:buFont typeface="Arial" panose="020B0604020202020204" pitchFamily="34" charset="0"/>
+              <a:buNone/>
+              <a:defRPr sz="2400" kern="1200">
+                <a:solidFill>
+                  <a:schemeClr val="tx1"/>
+                </a:solidFill>
+                <a:latin typeface="+mn-lt"/>
+                <a:ea typeface="+mn-ea"/>
+                <a:cs typeface="+mn-cs"/>
+              </a:defRPr>
+            </a:lvl1pPr>
+            <a:lvl2pPr marL="457200" indent="0" algn="ctr" defTabSz="914400" rtl="0" eaLnBrk="1" latinLnBrk="0" hangingPunct="1">
+              <a:lnSpc>
+                <a:spcPct val="90000"/>
+              </a:lnSpc>
+              <a:spcBef>
+                <a:spcPts val="500"/>
+              </a:spcBef>
+              <a:buFont typeface="Arial" panose="020B0604020202020204" pitchFamily="34" charset="0"/>
+              <a:buNone/>
+              <a:defRPr sz="2000" kern="1200">
+                <a:solidFill>
+                  <a:schemeClr val="tx1"/>
+                </a:solidFill>
+                <a:latin typeface="+mn-lt"/>
+                <a:ea typeface="+mn-ea"/>
+                <a:cs typeface="+mn-cs"/>
+              </a:defRPr>
+            </a:lvl2pPr>
+            <a:lvl3pPr marL="914400" indent="0" algn="ctr" defTabSz="914400" rtl="0" eaLnBrk="1" latinLnBrk="0" hangingPunct="1">
+              <a:lnSpc>
+                <a:spcPct val="90000"/>
+              </a:lnSpc>
+              <a:spcBef>
+                <a:spcPts val="500"/>
+              </a:spcBef>
+              <a:buFont typeface="Arial" panose="020B0604020202020204" pitchFamily="34" charset="0"/>
+              <a:buNone/>
+              <a:defRPr sz="1800" kern="1200">
+                <a:solidFill>
+                  <a:schemeClr val="tx1"/>
+                </a:solidFill>
+                <a:latin typeface="+mn-lt"/>
+                <a:ea typeface="+mn-ea"/>
+                <a:cs typeface="+mn-cs"/>
+              </a:defRPr>
+            </a:lvl3pPr>
+            <a:lvl4pPr marL="1371600" indent="0" algn="ctr" defTabSz="914400" rtl="0" eaLnBrk="1" latinLnBrk="0" hangingPunct="1">
+              <a:lnSpc>
+                <a:spcPct val="90000"/>
+              </a:lnSpc>
+              <a:spcBef>
+                <a:spcPts val="500"/>
+              </a:spcBef>
+              <a:buFont typeface="Arial" panose="020B0604020202020204" pitchFamily="34" charset="0"/>
+              <a:buNone/>
+              <a:defRPr sz="1600" kern="1200">
+                <a:solidFill>
+                  <a:schemeClr val="tx1"/>
+                </a:solidFill>
+                <a:latin typeface="+mn-lt"/>
+                <a:ea typeface="+mn-ea"/>
+                <a:cs typeface="+mn-cs"/>
+              </a:defRPr>
+            </a:lvl4pPr>
+            <a:lvl5pPr marL="1828800" indent="0" algn="ctr" defTabSz="914400" rtl="0" eaLnBrk="1" latinLnBrk="0" hangingPunct="1">
+              <a:lnSpc>
+                <a:spcPct val="90000"/>
+              </a:lnSpc>
+              <a:spcBef>
+                <a:spcPts val="500"/>
+              </a:spcBef>
+              <a:buFont typeface="Arial" panose="020B0604020202020204" pitchFamily="34" charset="0"/>
+              <a:buNone/>
+              <a:defRPr sz="1600" kern="1200">
+                <a:solidFill>
+                  <a:schemeClr val="tx1"/>
+                </a:solidFill>
+                <a:latin typeface="+mn-lt"/>
+                <a:ea typeface="+mn-ea"/>
+                <a:cs typeface="+mn-cs"/>
+              </a:defRPr>
+            </a:lvl5pPr>
+            <a:lvl6pPr marL="2286000" indent="0" algn="ctr" defTabSz="914400" rtl="0" eaLnBrk="1" latinLnBrk="0" hangingPunct="1">
+              <a:lnSpc>
+                <a:spcPct val="90000"/>
+              </a:lnSpc>
+              <a:spcBef>
+                <a:spcPts val="500"/>
+              </a:spcBef>
+              <a:buFont typeface="Arial" panose="020B0604020202020204" pitchFamily="34" charset="0"/>
+              <a:buNone/>
+              <a:defRPr sz="1600" kern="1200">
+                <a:solidFill>
+                  <a:schemeClr val="tx1"/>
+                </a:solidFill>
+                <a:latin typeface="+mn-lt"/>
+                <a:ea typeface="+mn-ea"/>
+                <a:cs typeface="+mn-cs"/>
+              </a:defRPr>
+            </a:lvl6pPr>
+            <a:lvl7pPr marL="2743200" indent="0" algn="ctr" defTabSz="914400" rtl="0" eaLnBrk="1" latinLnBrk="0" hangingPunct="1">
+              <a:lnSpc>
+                <a:spcPct val="90000"/>
+              </a:lnSpc>
+              <a:spcBef>
+                <a:spcPts val="500"/>
+              </a:spcBef>
+              <a:buFont typeface="Arial" panose="020B0604020202020204" pitchFamily="34" charset="0"/>
+              <a:buNone/>
+              <a:defRPr sz="1600" kern="1200">
+                <a:solidFill>
+                  <a:schemeClr val="tx1"/>
+                </a:solidFill>
+                <a:latin typeface="+mn-lt"/>
+                <a:ea typeface="+mn-ea"/>
+                <a:cs typeface="+mn-cs"/>
+              </a:defRPr>
+            </a:lvl7pPr>
+            <a:lvl8pPr marL="3200400" indent="0" algn="ctr" defTabSz="914400" rtl="0" eaLnBrk="1" latinLnBrk="0" hangingPunct="1">
+              <a:lnSpc>
+                <a:spcPct val="90000"/>
+              </a:lnSpc>
+              <a:spcBef>
+                <a:spcPts val="500"/>
+              </a:spcBef>
+              <a:buFont typeface="Arial" panose="020B0604020202020204" pitchFamily="34" charset="0"/>
+              <a:buNone/>
+              <a:defRPr sz="1600" kern="1200">
+                <a:solidFill>
+                  <a:schemeClr val="tx1"/>
+                </a:solidFill>
+                <a:latin typeface="+mn-lt"/>
+                <a:ea typeface="+mn-ea"/>
+                <a:cs typeface="+mn-cs"/>
+              </a:defRPr>
+            </a:lvl8pPr>
+            <a:lvl9pPr marL="3657600" indent="0" algn="ctr" defTabSz="914400" rtl="0" eaLnBrk="1" latinLnBrk="0" hangingPunct="1">
+              <a:lnSpc>
+                <a:spcPct val="90000"/>
+              </a:lnSpc>
+              <a:spcBef>
+                <a:spcPts val="500"/>
+              </a:spcBef>
+              <a:buFont typeface="Arial" panose="020B0604020202020204" pitchFamily="34" charset="0"/>
+              <a:buNone/>
+              <a:defRPr sz="1600" kern="1200">
+                <a:solidFill>
+                  <a:schemeClr val="tx1"/>
+                </a:solidFill>
+                <a:latin typeface="+mn-lt"/>
+                <a:ea typeface="+mn-ea"/>
+                <a:cs typeface="+mn-cs"/>
+              </a:defRPr>
+            </a:lvl9pPr>
+          </a:lstStyle>
+          <a:p>
+            <a:pPr algn="l"/>
+            <a:r>
+              <a:rPr lang="en-US" sz="1800">
+                <a:sym typeface="Wingdings" pitchFamily="2" charset="2"/>
+              </a:rPr>
+              <a:t>- Lets say for example, we want to create a ... class for other devs to .... Our objective is to provide some ... and ... for the devs to use. And then, devs will ... the provided ... or create .... Also, we want our class can't ... </a:t>
+            </a:r>
+          </a:p>
+          <a:p>
+            <a:pPr algn="l"/>
+            <a:r>
+              <a:rPr lang="en-US" sz="1800">
+                <a:sym typeface="Wingdings" pitchFamily="2" charset="2"/>
+              </a:rPr>
+              <a:t>=&gt; We can ... by using "</a:t>
+            </a:r>
+            <a:r>
+              <a:rPr lang="en-US" sz="1800" b="1">
+                <a:sym typeface="Wingdings" pitchFamily="2" charset="2"/>
+              </a:rPr>
+              <a:t>abstract" </a:t>
+            </a:r>
+            <a:r>
+              <a:rPr lang="en-US" sz="1800">
+                <a:sym typeface="Wingdings" pitchFamily="2" charset="2"/>
+              </a:rPr>
+              <a:t>... </a:t>
+            </a:r>
+          </a:p>
+          <a:p>
+            <a:pPr algn="l"/>
+            <a:r>
+              <a:rPr lang="en-US" sz="1800">
+                <a:sym typeface="Wingdings" pitchFamily="2" charset="2"/>
+              </a:rPr>
+              <a:t>- In Abstract ..., we have a ... called Abstract...</a:t>
+            </a:r>
+          </a:p>
+          <a:p>
+            <a:pPr algn="l"/>
+            <a:r>
+              <a:rPr lang="en-US" sz="1800">
+                <a:sym typeface="Wingdings" pitchFamily="2" charset="2"/>
+              </a:rPr>
+              <a:t>– Abstract method is a method where ...</a:t>
+            </a:r>
+          </a:p>
+          <a:p>
+            <a:pPr algn="l"/>
+            <a:r>
+              <a:rPr lang="en-US" sz="1800">
+                <a:sym typeface="Wingdings" pitchFamily="2" charset="2"/>
+              </a:rPr>
+              <a:t>(code illustration snippet 24) </a:t>
+            </a:r>
+          </a:p>
+        </p:txBody>
+      </p:sp>
+    </p:spTree>
+    <p:extLst>
+      <p:ext uri="{BB962C8B-B14F-4D97-AF65-F5344CB8AC3E}">
+        <p14:creationId xmlns:p14="http://schemas.microsoft.com/office/powerpoint/2010/main" val="510156328"/>
+      </p:ext>
+    </p:extLst>
+  </p:cSld>
+  <p:clrMapOvr>
+    <a:masterClrMapping/>
+  </p:clrMapOvr>
+  <p:timing>
+    <p:tnLst>
+      <p:par>
+        <p:cTn id="1" dur="indefinite" restart="never" nodeType="tmRoot">
+          <p:childTnLst>
+            <p:seq concurrent="1" nextAc="seek">
+              <p:cTn id="2" dur="indefinite" nodeType="mainSeq">
+                <p:childTnLst>
+                  <p:par>
+                    <p:cTn id="3" fill="hold">
+                      <p:stCondLst>
+                        <p:cond delay="indefinite"/>
+                      </p:stCondLst>
+                      <p:childTnLst>
+                        <p:par>
+                          <p:cTn id="4" fill="hold">
+                            <p:stCondLst>
+                              <p:cond delay="0"/>
+                            </p:stCondLst>
+                            <p:childTnLst>
+                              <p:par>
+                                <p:cTn id="5" presetID="1" presetClass="entr" presetSubtype="0" fill="hold" nodeType="clickEffect">
+                                  <p:stCondLst>
+                                    <p:cond delay="0"/>
+                                  </p:stCondLst>
+                                  <p:childTnLst>
+                                    <p:set>
+                                      <p:cBhvr>
+                                        <p:cTn id="6" dur="1" fill="hold">
+                                          <p:stCondLst>
+                                            <p:cond delay="0"/>
+                                          </p:stCondLst>
+                                        </p:cTn>
+                                        <p:tgtEl>
+                                          <p:spTgt spid="4">
+                                            <p:txEl>
+                                              <p:pRg st="0" end="0"/>
+                                            </p:txEl>
+                                          </p:spTgt>
+                                        </p:tgtEl>
+                                        <p:attrNameLst>
+                                          <p:attrName>style.visibility</p:attrName>
+                                        </p:attrNameLst>
+                                      </p:cBhvr>
+                                      <p:to>
+                                        <p:strVal val="visible"/>
+                                      </p:to>
+                                    </p:set>
+                                  </p:childTnLst>
+                                </p:cTn>
+                              </p:par>
+                            </p:childTnLst>
+                          </p:cTn>
+                        </p:par>
+                      </p:childTnLst>
+                    </p:cTn>
+                  </p:par>
+                  <p:par>
+                    <p:cTn id="7" fill="hold">
+                      <p:stCondLst>
+                        <p:cond delay="indefinite"/>
+                      </p:stCondLst>
+                      <p:childTnLst>
+                        <p:par>
+                          <p:cTn id="8" fill="hold">
+                            <p:stCondLst>
+                              <p:cond delay="0"/>
+                            </p:stCondLst>
+                            <p:childTnLst>
+                              <p:par>
+                                <p:cTn id="9" presetID="1" presetClass="entr" presetSubtype="0" fill="hold" nodeType="clickEffect">
+                                  <p:stCondLst>
+                                    <p:cond delay="0"/>
+                                  </p:stCondLst>
+                                  <p:childTnLst>
+                                    <p:set>
+                                      <p:cBhvr>
+                                        <p:cTn id="10" dur="1" fill="hold">
+                                          <p:stCondLst>
+                                            <p:cond delay="0"/>
+                                          </p:stCondLst>
+                                        </p:cTn>
+                                        <p:tgtEl>
+                                          <p:spTgt spid="4">
+                                            <p:txEl>
+                                              <p:pRg st="1" end="1"/>
+                                            </p:txEl>
+                                          </p:spTgt>
+                                        </p:tgtEl>
+                                        <p:attrNameLst>
+                                          <p:attrName>style.visibility</p:attrName>
+                                        </p:attrNameLst>
+                                      </p:cBhvr>
+                                      <p:to>
+                                        <p:strVal val="visible"/>
+                                      </p:to>
+                                    </p:set>
+                                  </p:childTnLst>
+                                </p:cTn>
+                              </p:par>
+                            </p:childTnLst>
+                          </p:cTn>
+                        </p:par>
+                      </p:childTnLst>
+                    </p:cTn>
+                  </p:par>
+                  <p:par>
+                    <p:cTn id="11" fill="hold">
+                      <p:stCondLst>
+                        <p:cond delay="indefinite"/>
+                      </p:stCondLst>
+                      <p:childTnLst>
+                        <p:par>
+                          <p:cTn id="12" fill="hold">
+                            <p:stCondLst>
+                              <p:cond delay="0"/>
+                            </p:stCondLst>
+                            <p:childTnLst>
+                              <p:par>
+                                <p:cTn id="13" presetID="1" presetClass="entr" presetSubtype="0" fill="hold" nodeType="clickEffect">
+                                  <p:stCondLst>
+                                    <p:cond delay="0"/>
+                                  </p:stCondLst>
+                                  <p:childTnLst>
+                                    <p:set>
+                                      <p:cBhvr>
+                                        <p:cTn id="14" dur="1" fill="hold">
+                                          <p:stCondLst>
+                                            <p:cond delay="0"/>
+                                          </p:stCondLst>
+                                        </p:cTn>
+                                        <p:tgtEl>
+                                          <p:spTgt spid="4">
+                                            <p:txEl>
+                                              <p:pRg st="2" end="2"/>
+                                            </p:txEl>
+                                          </p:spTgt>
+                                        </p:tgtEl>
+                                        <p:attrNameLst>
+                                          <p:attrName>style.visibility</p:attrName>
+                                        </p:attrNameLst>
+                                      </p:cBhvr>
+                                      <p:to>
+                                        <p:strVal val="visible"/>
+                                      </p:to>
+                                    </p:set>
+                                  </p:childTnLst>
+                                </p:cTn>
+                              </p:par>
+                            </p:childTnLst>
+                          </p:cTn>
+                        </p:par>
+                      </p:childTnLst>
+                    </p:cTn>
+                  </p:par>
+                  <p:par>
+                    <p:cTn id="15" fill="hold">
+                      <p:stCondLst>
+                        <p:cond delay="indefinite"/>
+                      </p:stCondLst>
+                      <p:childTnLst>
+                        <p:par>
+                          <p:cTn id="16" fill="hold">
+                            <p:stCondLst>
+                              <p:cond delay="0"/>
+                            </p:stCondLst>
+                            <p:childTnLst>
+                              <p:par>
+                                <p:cTn id="17" presetID="1" presetClass="entr" presetSubtype="0" fill="hold" nodeType="clickEffect">
+                                  <p:stCondLst>
+                                    <p:cond delay="0"/>
+                                  </p:stCondLst>
+                                  <p:childTnLst>
+                                    <p:set>
+                                      <p:cBhvr>
+                                        <p:cTn id="18" dur="1" fill="hold">
+                                          <p:stCondLst>
+                                            <p:cond delay="0"/>
+                                          </p:stCondLst>
+                                        </p:cTn>
+                                        <p:tgtEl>
+                                          <p:spTgt spid="4">
+                                            <p:txEl>
+                                              <p:pRg st="3" end="3"/>
+                                            </p:txEl>
+                                          </p:spTgt>
+                                        </p:tgtEl>
+                                        <p:attrNameLst>
+                                          <p:attrName>style.visibility</p:attrName>
+                                        </p:attrNameLst>
+                                      </p:cBhvr>
+                                      <p:to>
+                                        <p:strVal val="visible"/>
+                                      </p:to>
+                                    </p:set>
+                                  </p:childTnLst>
+                                </p:cTn>
+                              </p:par>
+                            </p:childTnLst>
+                          </p:cTn>
+                        </p:par>
+                      </p:childTnLst>
+                    </p:cTn>
+                  </p:par>
+                  <p:par>
+                    <p:cTn id="19" fill="hold">
+                      <p:stCondLst>
+                        <p:cond delay="indefinite"/>
+                      </p:stCondLst>
+                      <p:childTnLst>
+                        <p:par>
+                          <p:cTn id="20" fill="hold">
+                            <p:stCondLst>
+                              <p:cond delay="0"/>
+                            </p:stCondLst>
+                            <p:childTnLst>
+                              <p:par>
+                                <p:cTn id="21" presetID="1" presetClass="entr" presetSubtype="0" fill="hold" nodeType="clickEffect">
+                                  <p:stCondLst>
+                                    <p:cond delay="0"/>
+                                  </p:stCondLst>
+                                  <p:childTnLst>
+                                    <p:set>
+                                      <p:cBhvr>
+                                        <p:cTn id="22" dur="1" fill="hold">
+                                          <p:stCondLst>
+                                            <p:cond delay="0"/>
+                                          </p:stCondLst>
+                                        </p:cTn>
+                                        <p:tgtEl>
+                                          <p:spTgt spid="4">
+                                            <p:txEl>
+                                              <p:pRg st="4" end="4"/>
+                                            </p:txEl>
+                                          </p:spTgt>
+                                        </p:tgtEl>
+                                        <p:attrNameLst>
+                                          <p:attrName>style.visibility</p:attrName>
+                                        </p:attrNameLst>
+                                      </p:cBhvr>
+                                      <p:to>
+                                        <p:strVal val="visible"/>
+                                      </p:to>
+                                    </p:set>
+                                  </p:childTnLst>
+                                </p:cTn>
+                              </p:par>
+                            </p:childTnLst>
+                          </p:cTn>
+                        </p:par>
+                      </p:childTnLst>
+                    </p:cTn>
+                  </p:par>
+                </p:childTnLst>
+              </p:cTn>
+              <p:prevCondLst>
+                <p:cond evt="onPrev" delay="0">
+                  <p:tgtEl>
+                    <p:sldTgt/>
+                  </p:tgtEl>
+                </p:cond>
+              </p:prevCondLst>
+              <p:nextCondLst>
+                <p:cond evt="onNext" delay="0">
+                  <p:tgtEl>
+                    <p:sldTgt/>
+                  </p:tgtEl>
+                </p:cond>
+              </p:nextCondLst>
+            </p:seq>
+          </p:childTnLst>
+        </p:cTn>
+      </p:par>
+    </p:tnLst>
+  </p:timing>
+</p:sld>
+</file>
+
+<file path=ppt/slides/slide19.xml><?xml version="1.0" encoding="utf-8"?>
+<p:sld xmlns:a="http://schemas.openxmlformats.org/drawingml/2006/main" xmlns:r="http://schemas.openxmlformats.org/officeDocument/2006/relationships" xmlns:p="http://schemas.openxmlformats.org/presentationml/2006/main">
+  <p:cSld>
+    <p:spTree>
+      <p:nvGrpSpPr>
+        <p:cNvPr id="1" name="">
+          <a:extLst>
+            <a:ext uri="{FF2B5EF4-FFF2-40B4-BE49-F238E27FC236}">
+              <a16:creationId xmlns:a16="http://schemas.microsoft.com/office/drawing/2014/main" id="{27D456DA-5FAF-4911-B9BB-2838B0975197}"/>
+            </a:ext>
+          </a:extLst>
+        </p:cNvPr>
+        <p:cNvGrpSpPr/>
+        <p:nvPr/>
+      </p:nvGrpSpPr>
+      <p:grpSpPr>
+        <a:xfrm>
+          <a:off x="0" y="0"/>
+          <a:ext cx="0" cy="0"/>
+          <a:chOff x="0" y="0"/>
+          <a:chExt cx="0" cy="0"/>
+        </a:xfrm>
+      </p:grpSpPr>
+      <p:sp>
+        <p:nvSpPr>
+          <p:cNvPr id="3" name="Subtitle 2">
+            <a:extLst>
+              <a:ext uri="{FF2B5EF4-FFF2-40B4-BE49-F238E27FC236}">
+                <a16:creationId xmlns:a16="http://schemas.microsoft.com/office/drawing/2014/main" id="{39D8F468-DAE3-0519-8C64-9E6662FAEB70}"/>
+              </a:ext>
+            </a:extLst>
+          </p:cNvPr>
+          <p:cNvSpPr>
+            <a:spLocks noGrp="1"/>
+          </p:cNvSpPr>
+          <p:nvPr>
+            <p:ph type="subTitle" idx="1"/>
+          </p:nvPr>
+        </p:nvSpPr>
+        <p:spPr>
+          <a:xfrm>
+            <a:off x="152399" y="217488"/>
+            <a:ext cx="11223171" cy="303212"/>
+          </a:xfrm>
+        </p:spPr>
+        <p:txBody>
+          <a:bodyPr>
+            <a:normAutofit fontScale="92500" lnSpcReduction="20000"/>
+          </a:bodyPr>
+          <a:lstStyle/>
+          <a:p>
+            <a:r>
+              <a:rPr lang="en-US" sz="1800" b="1"/>
+              <a:t>Creating Abstract class – Defining an Abstract class</a:t>
+            </a:r>
+          </a:p>
+        </p:txBody>
+      </p:sp>
+      <p:sp>
+        <p:nvSpPr>
+          <p:cNvPr id="4" name="Subtitle 2">
+            <a:extLst>
+              <a:ext uri="{FF2B5EF4-FFF2-40B4-BE49-F238E27FC236}">
+                <a16:creationId xmlns:a16="http://schemas.microsoft.com/office/drawing/2014/main" id="{B1C4CCED-09B7-D364-4EA3-D576A384D2C9}"/>
+              </a:ext>
+            </a:extLst>
+          </p:cNvPr>
+          <p:cNvSpPr txBox="1">
+            <a:spLocks/>
+          </p:cNvSpPr>
+          <p:nvPr/>
+        </p:nvSpPr>
+        <p:spPr>
+          <a:xfrm>
+            <a:off x="0" y="820738"/>
+            <a:ext cx="12192000" cy="6037262"/>
+          </a:xfrm>
+          <a:prstGeom prst="rect">
+            <a:avLst/>
+          </a:prstGeom>
+        </p:spPr>
+        <p:txBody>
+          <a:bodyPr vert="horz" lIns="91440" tIns="45720" rIns="91440" bIns="45720" rtlCol="0">
+            <a:normAutofit/>
+          </a:bodyPr>
+          <a:lstStyle>
+            <a:lvl1pPr marL="0" indent="0" algn="ctr" defTabSz="914400" rtl="0" eaLnBrk="1" latinLnBrk="0" hangingPunct="1">
+              <a:lnSpc>
+                <a:spcPct val="90000"/>
+              </a:lnSpc>
+              <a:spcBef>
+                <a:spcPts val="1000"/>
+              </a:spcBef>
+              <a:buFont typeface="Arial" panose="020B0604020202020204" pitchFamily="34" charset="0"/>
+              <a:buNone/>
+              <a:defRPr sz="2400" kern="1200">
+                <a:solidFill>
+                  <a:schemeClr val="tx1"/>
+                </a:solidFill>
+                <a:latin typeface="+mn-lt"/>
+                <a:ea typeface="+mn-ea"/>
+                <a:cs typeface="+mn-cs"/>
+              </a:defRPr>
+            </a:lvl1pPr>
+            <a:lvl2pPr marL="457200" indent="0" algn="ctr" defTabSz="914400" rtl="0" eaLnBrk="1" latinLnBrk="0" hangingPunct="1">
+              <a:lnSpc>
+                <a:spcPct val="90000"/>
+              </a:lnSpc>
+              <a:spcBef>
+                <a:spcPts val="500"/>
+              </a:spcBef>
+              <a:buFont typeface="Arial" panose="020B0604020202020204" pitchFamily="34" charset="0"/>
+              <a:buNone/>
+              <a:defRPr sz="2000" kern="1200">
+                <a:solidFill>
+                  <a:schemeClr val="tx1"/>
+                </a:solidFill>
+                <a:latin typeface="+mn-lt"/>
+                <a:ea typeface="+mn-ea"/>
+                <a:cs typeface="+mn-cs"/>
+              </a:defRPr>
+            </a:lvl2pPr>
+            <a:lvl3pPr marL="914400" indent="0" algn="ctr" defTabSz="914400" rtl="0" eaLnBrk="1" latinLnBrk="0" hangingPunct="1">
+              <a:lnSpc>
+                <a:spcPct val="90000"/>
+              </a:lnSpc>
+              <a:spcBef>
+                <a:spcPts val="500"/>
+              </a:spcBef>
+              <a:buFont typeface="Arial" panose="020B0604020202020204" pitchFamily="34" charset="0"/>
+              <a:buNone/>
+              <a:defRPr sz="1800" kern="1200">
+                <a:solidFill>
+                  <a:schemeClr val="tx1"/>
+                </a:solidFill>
+                <a:latin typeface="+mn-lt"/>
+                <a:ea typeface="+mn-ea"/>
+                <a:cs typeface="+mn-cs"/>
+              </a:defRPr>
+            </a:lvl3pPr>
+            <a:lvl4pPr marL="1371600" indent="0" algn="ctr" defTabSz="914400" rtl="0" eaLnBrk="1" latinLnBrk="0" hangingPunct="1">
+              <a:lnSpc>
+                <a:spcPct val="90000"/>
+              </a:lnSpc>
+              <a:spcBef>
+                <a:spcPts val="500"/>
+              </a:spcBef>
+              <a:buFont typeface="Arial" panose="020B0604020202020204" pitchFamily="34" charset="0"/>
+              <a:buNone/>
+              <a:defRPr sz="1600" kern="1200">
+                <a:solidFill>
+                  <a:schemeClr val="tx1"/>
+                </a:solidFill>
+                <a:latin typeface="+mn-lt"/>
+                <a:ea typeface="+mn-ea"/>
+                <a:cs typeface="+mn-cs"/>
+              </a:defRPr>
+            </a:lvl4pPr>
+            <a:lvl5pPr marL="1828800" indent="0" algn="ctr" defTabSz="914400" rtl="0" eaLnBrk="1" latinLnBrk="0" hangingPunct="1">
+              <a:lnSpc>
+                <a:spcPct val="90000"/>
+              </a:lnSpc>
+              <a:spcBef>
+                <a:spcPts val="500"/>
+              </a:spcBef>
+              <a:buFont typeface="Arial" panose="020B0604020202020204" pitchFamily="34" charset="0"/>
+              <a:buNone/>
+              <a:defRPr sz="1600" kern="1200">
+                <a:solidFill>
+                  <a:schemeClr val="tx1"/>
+                </a:solidFill>
+                <a:latin typeface="+mn-lt"/>
+                <a:ea typeface="+mn-ea"/>
+                <a:cs typeface="+mn-cs"/>
+              </a:defRPr>
+            </a:lvl5pPr>
+            <a:lvl6pPr marL="2286000" indent="0" algn="ctr" defTabSz="914400" rtl="0" eaLnBrk="1" latinLnBrk="0" hangingPunct="1">
+              <a:lnSpc>
+                <a:spcPct val="90000"/>
+              </a:lnSpc>
+              <a:spcBef>
+                <a:spcPts val="500"/>
+              </a:spcBef>
+              <a:buFont typeface="Arial" panose="020B0604020202020204" pitchFamily="34" charset="0"/>
+              <a:buNone/>
+              <a:defRPr sz="1600" kern="1200">
+                <a:solidFill>
+                  <a:schemeClr val="tx1"/>
+                </a:solidFill>
+                <a:latin typeface="+mn-lt"/>
+                <a:ea typeface="+mn-ea"/>
+                <a:cs typeface="+mn-cs"/>
+              </a:defRPr>
+            </a:lvl6pPr>
+            <a:lvl7pPr marL="2743200" indent="0" algn="ctr" defTabSz="914400" rtl="0" eaLnBrk="1" latinLnBrk="0" hangingPunct="1">
+              <a:lnSpc>
+                <a:spcPct val="90000"/>
+              </a:lnSpc>
+              <a:spcBef>
+                <a:spcPts val="500"/>
+              </a:spcBef>
+              <a:buFont typeface="Arial" panose="020B0604020202020204" pitchFamily="34" charset="0"/>
+              <a:buNone/>
+              <a:defRPr sz="1600" kern="1200">
+                <a:solidFill>
+                  <a:schemeClr val="tx1"/>
+                </a:solidFill>
+                <a:latin typeface="+mn-lt"/>
+                <a:ea typeface="+mn-ea"/>
+                <a:cs typeface="+mn-cs"/>
+              </a:defRPr>
+            </a:lvl7pPr>
+            <a:lvl8pPr marL="3200400" indent="0" algn="ctr" defTabSz="914400" rtl="0" eaLnBrk="1" latinLnBrk="0" hangingPunct="1">
+              <a:lnSpc>
+                <a:spcPct val="90000"/>
+              </a:lnSpc>
+              <a:spcBef>
+                <a:spcPts val="500"/>
+              </a:spcBef>
+              <a:buFont typeface="Arial" panose="020B0604020202020204" pitchFamily="34" charset="0"/>
+              <a:buNone/>
+              <a:defRPr sz="1600" kern="1200">
+                <a:solidFill>
+                  <a:schemeClr val="tx1"/>
+                </a:solidFill>
+                <a:latin typeface="+mn-lt"/>
+                <a:ea typeface="+mn-ea"/>
+                <a:cs typeface="+mn-cs"/>
+              </a:defRPr>
+            </a:lvl8pPr>
+            <a:lvl9pPr marL="3657600" indent="0" algn="ctr" defTabSz="914400" rtl="0" eaLnBrk="1" latinLnBrk="0" hangingPunct="1">
+              <a:lnSpc>
+                <a:spcPct val="90000"/>
+              </a:lnSpc>
+              <a:spcBef>
+                <a:spcPts val="500"/>
+              </a:spcBef>
+              <a:buFont typeface="Arial" panose="020B0604020202020204" pitchFamily="34" charset="0"/>
+              <a:buNone/>
+              <a:defRPr sz="1600" kern="1200">
+                <a:solidFill>
+                  <a:schemeClr val="tx1"/>
+                </a:solidFill>
+                <a:latin typeface="+mn-lt"/>
+                <a:ea typeface="+mn-ea"/>
+                <a:cs typeface="+mn-cs"/>
+              </a:defRPr>
+            </a:lvl9pPr>
+          </a:lstStyle>
+          <a:p>
+            <a:pPr algn="l"/>
+            <a:r>
+              <a:rPr lang="en-US" sz="1800">
+                <a:sym typeface="Wingdings" pitchFamily="2" charset="2"/>
+              </a:rPr>
+              <a:t>- Unlike what I have been taught with Abstract class definition (which is ...),  however, an Abstract class can have ...</a:t>
+            </a:r>
+          </a:p>
+          <a:p>
+            <a:pPr algn="l"/>
+            <a:r>
+              <a:rPr lang="en-US" sz="1800">
+                <a:sym typeface="Wingdings" pitchFamily="2" charset="2"/>
+              </a:rPr>
+              <a:t>(code illustration snippet 25)</a:t>
+            </a:r>
+          </a:p>
+          <a:p>
+            <a:pPr algn="l"/>
+            <a:r>
+              <a:rPr lang="en-US" sz="1800">
+                <a:sym typeface="Wingdings" pitchFamily="2" charset="2"/>
+              </a:rPr>
+              <a:t>– Class that use ... keyword =&gt; Can't ...ed</a:t>
+            </a:r>
+          </a:p>
+          <a:p>
+            <a:pPr algn="l"/>
+            <a:r>
+              <a:rPr lang="en-US" sz="1800">
+                <a:sym typeface="Wingdings" pitchFamily="2" charset="2"/>
+              </a:rPr>
+              <a:t>– Class that use "Abstract" ... =&gt; Must be ...</a:t>
+            </a:r>
+          </a:p>
+          <a:p>
+            <a:pPr algn="l"/>
+            <a:r>
+              <a:rPr lang="en-US" sz="1800">
+                <a:sym typeface="Wingdings" pitchFamily="2" charset="2"/>
+              </a:rPr>
+              <a:t>=&gt; When ... these 2 keywords =&gt; there will be ... </a:t>
+            </a:r>
+          </a:p>
+          <a:p>
+            <a:pPr algn="l"/>
+            <a:r>
+              <a:rPr lang="en-US" sz="1800">
+                <a:sym typeface="Wingdings" pitchFamily="2" charset="2"/>
+              </a:rPr>
+              <a:t>(code illustration snippet 26) </a:t>
+            </a:r>
+          </a:p>
+          <a:p>
+            <a:pPr algn="l"/>
+            <a:r>
+              <a:rPr lang="en-US" sz="1800">
+                <a:sym typeface="Wingdings" pitchFamily="2" charset="2"/>
+              </a:rPr>
+              <a:t>- The ... thing also apply to ... </a:t>
+            </a:r>
+          </a:p>
+          <a:p>
+            <a:pPr algn="l"/>
+            <a:r>
+              <a:rPr lang="en-US" sz="1800">
+                <a:sym typeface="Wingdings" pitchFamily="2" charset="2"/>
+              </a:rPr>
+              <a:t>(code illustration snippet 27) </a:t>
+            </a:r>
+          </a:p>
+          <a:p>
+            <a:pPr algn="l"/>
+            <a:r>
+              <a:rPr lang="en-US" sz="1800">
+                <a:sym typeface="Wingdings" pitchFamily="2" charset="2"/>
+              </a:rPr>
+              <a:t>- Abstract method doesn't work with ... because if we set it to ... =&gt; There will be no ... concept =&gt; ...</a:t>
+            </a:r>
+          </a:p>
+          <a:p>
+            <a:pPr algn="l"/>
+            <a:r>
+              <a:rPr lang="en-US" sz="1800">
+                <a:sym typeface="Wingdings" pitchFamily="2" charset="2"/>
+              </a:rPr>
+              <a:t>(code illustration snippet 28 - 29)</a:t>
+            </a:r>
+          </a:p>
+          <a:p>
+            <a:pPr algn="l"/>
+            <a:r>
+              <a:rPr lang="en-US" sz="1800">
+                <a:sym typeface="Wingdings" pitchFamily="2" charset="2"/>
+              </a:rPr>
+              <a:t>- An abstract class is only useful when ... =&gt; The class that ... the abstract class are called "..." because it is the first ... class that ... the abstract class</a:t>
+            </a:r>
+          </a:p>
+          <a:p>
+            <a:pPr algn="l"/>
+            <a:r>
+              <a:rPr lang="en-US" sz="1800">
+                <a:sym typeface="Wingdings" pitchFamily="2" charset="2"/>
+              </a:rPr>
+              <a:t>– All class that ... the abstract class are required to ... </a:t>
+            </a:r>
+          </a:p>
+          <a:p>
+            <a:pPr algn="l"/>
+            <a:r>
+              <a:rPr lang="en-US" sz="1800">
+                <a:sym typeface="Wingdings" pitchFamily="2" charset="2"/>
+              </a:rPr>
+              <a:t>(code illustration snippet 30 - 31)  </a:t>
+            </a:r>
+          </a:p>
+        </p:txBody>
+      </p:sp>
+    </p:spTree>
+    <p:extLst>
+      <p:ext uri="{BB962C8B-B14F-4D97-AF65-F5344CB8AC3E}">
+        <p14:creationId xmlns:p14="http://schemas.microsoft.com/office/powerpoint/2010/main" val="1816377882"/>
+      </p:ext>
+    </p:extLst>
+  </p:cSld>
+  <p:clrMapOvr>
+    <a:masterClrMapping/>
+  </p:clrMapOvr>
+  <p:timing>
+    <p:tnLst>
+      <p:par>
+        <p:cTn id="1" dur="indefinite" restart="never" nodeType="tmRoot">
+          <p:childTnLst>
+            <p:seq concurrent="1" nextAc="seek">
+              <p:cTn id="2" dur="indefinite" nodeType="mainSeq">
+                <p:childTnLst>
+                  <p:par>
+                    <p:cTn id="3" fill="hold">
+                      <p:stCondLst>
+                        <p:cond delay="indefinite"/>
+                      </p:stCondLst>
+                      <p:childTnLst>
+                        <p:par>
+                          <p:cTn id="4" fill="hold">
+                            <p:stCondLst>
+                              <p:cond delay="0"/>
+                            </p:stCondLst>
+                            <p:childTnLst>
+                              <p:par>
+                                <p:cTn id="5" presetID="1" presetClass="entr" presetSubtype="0" fill="hold" nodeType="clickEffect">
+                                  <p:stCondLst>
+                                    <p:cond delay="0"/>
+                                  </p:stCondLst>
+                                  <p:childTnLst>
+                                    <p:set>
+                                      <p:cBhvr>
+                                        <p:cTn id="6" dur="1" fill="hold">
+                                          <p:stCondLst>
+                                            <p:cond delay="0"/>
+                                          </p:stCondLst>
+                                        </p:cTn>
+                                        <p:tgtEl>
+                                          <p:spTgt spid="4">
+                                            <p:txEl>
+                                              <p:pRg st="0" end="0"/>
+                                            </p:txEl>
+                                          </p:spTgt>
+                                        </p:tgtEl>
+                                        <p:attrNameLst>
+                                          <p:attrName>style.visibility</p:attrName>
+                                        </p:attrNameLst>
+                                      </p:cBhvr>
+                                      <p:to>
+                                        <p:strVal val="visible"/>
+                                      </p:to>
+                                    </p:set>
+                                  </p:childTnLst>
+                                </p:cTn>
+                              </p:par>
+                            </p:childTnLst>
+                          </p:cTn>
+                        </p:par>
+                      </p:childTnLst>
+                    </p:cTn>
+                  </p:par>
+                  <p:par>
+                    <p:cTn id="7" fill="hold">
+                      <p:stCondLst>
+                        <p:cond delay="indefinite"/>
+                      </p:stCondLst>
+                      <p:childTnLst>
+                        <p:par>
+                          <p:cTn id="8" fill="hold">
+                            <p:stCondLst>
+                              <p:cond delay="0"/>
+                            </p:stCondLst>
+                            <p:childTnLst>
+                              <p:par>
+                                <p:cTn id="9" presetID="1" presetClass="entr" presetSubtype="0" fill="hold" nodeType="clickEffect">
+                                  <p:stCondLst>
+                                    <p:cond delay="0"/>
+                                  </p:stCondLst>
+                                  <p:childTnLst>
+                                    <p:set>
+                                      <p:cBhvr>
+                                        <p:cTn id="10" dur="1" fill="hold">
+                                          <p:stCondLst>
+                                            <p:cond delay="0"/>
+                                          </p:stCondLst>
+                                        </p:cTn>
+                                        <p:tgtEl>
+                                          <p:spTgt spid="4">
+                                            <p:txEl>
+                                              <p:pRg st="1" end="1"/>
+                                            </p:txEl>
+                                          </p:spTgt>
+                                        </p:tgtEl>
+                                        <p:attrNameLst>
+                                          <p:attrName>style.visibility</p:attrName>
+                                        </p:attrNameLst>
+                                      </p:cBhvr>
+                                      <p:to>
+                                        <p:strVal val="visible"/>
+                                      </p:to>
+                                    </p:set>
+                                  </p:childTnLst>
+                                </p:cTn>
+                              </p:par>
+                            </p:childTnLst>
+                          </p:cTn>
+                        </p:par>
+                      </p:childTnLst>
+                    </p:cTn>
+                  </p:par>
+                  <p:par>
+                    <p:cTn id="11" fill="hold">
+                      <p:stCondLst>
+                        <p:cond delay="indefinite"/>
+                      </p:stCondLst>
+                      <p:childTnLst>
+                        <p:par>
+                          <p:cTn id="12" fill="hold">
+                            <p:stCondLst>
+                              <p:cond delay="0"/>
+                            </p:stCondLst>
+                            <p:childTnLst>
+                              <p:par>
+                                <p:cTn id="13" presetID="1" presetClass="entr" presetSubtype="0" fill="hold" nodeType="clickEffect">
+                                  <p:stCondLst>
+                                    <p:cond delay="0"/>
+                                  </p:stCondLst>
+                                  <p:childTnLst>
+                                    <p:set>
+                                      <p:cBhvr>
+                                        <p:cTn id="14" dur="1" fill="hold">
+                                          <p:stCondLst>
+                                            <p:cond delay="0"/>
+                                          </p:stCondLst>
+                                        </p:cTn>
+                                        <p:tgtEl>
+                                          <p:spTgt spid="4">
+                                            <p:txEl>
+                                              <p:pRg st="2" end="2"/>
+                                            </p:txEl>
+                                          </p:spTgt>
+                                        </p:tgtEl>
+                                        <p:attrNameLst>
+                                          <p:attrName>style.visibility</p:attrName>
+                                        </p:attrNameLst>
+                                      </p:cBhvr>
+                                      <p:to>
+                                        <p:strVal val="visible"/>
+                                      </p:to>
+                                    </p:set>
+                                  </p:childTnLst>
+                                </p:cTn>
+                              </p:par>
+                            </p:childTnLst>
+                          </p:cTn>
+                        </p:par>
+                      </p:childTnLst>
+                    </p:cTn>
+                  </p:par>
+                  <p:par>
+                    <p:cTn id="15" fill="hold">
+                      <p:stCondLst>
+                        <p:cond delay="indefinite"/>
+                      </p:stCondLst>
+                      <p:childTnLst>
+                        <p:par>
+                          <p:cTn id="16" fill="hold">
+                            <p:stCondLst>
+                              <p:cond delay="0"/>
+                            </p:stCondLst>
+                            <p:childTnLst>
+                              <p:par>
+                                <p:cTn id="17" presetID="1" presetClass="entr" presetSubtype="0" fill="hold" nodeType="clickEffect">
+                                  <p:stCondLst>
+                                    <p:cond delay="0"/>
+                                  </p:stCondLst>
+                                  <p:childTnLst>
+                                    <p:set>
+                                      <p:cBhvr>
+                                        <p:cTn id="18" dur="1" fill="hold">
+                                          <p:stCondLst>
+                                            <p:cond delay="0"/>
+                                          </p:stCondLst>
+                                        </p:cTn>
+                                        <p:tgtEl>
+                                          <p:spTgt spid="4">
+                                            <p:txEl>
+                                              <p:pRg st="3" end="3"/>
+                                            </p:txEl>
+                                          </p:spTgt>
+                                        </p:tgtEl>
+                                        <p:attrNameLst>
+                                          <p:attrName>style.visibility</p:attrName>
+                                        </p:attrNameLst>
+                                      </p:cBhvr>
+                                      <p:to>
+                                        <p:strVal val="visible"/>
+                                      </p:to>
+                                    </p:set>
+                                  </p:childTnLst>
+                                </p:cTn>
+                              </p:par>
+                            </p:childTnLst>
+                          </p:cTn>
+                        </p:par>
+                      </p:childTnLst>
+                    </p:cTn>
+                  </p:par>
+                  <p:par>
+                    <p:cTn id="19" fill="hold">
+                      <p:stCondLst>
+                        <p:cond delay="indefinite"/>
+                      </p:stCondLst>
+                      <p:childTnLst>
+                        <p:par>
+                          <p:cTn id="20" fill="hold">
+                            <p:stCondLst>
+                              <p:cond delay="0"/>
+                            </p:stCondLst>
+                            <p:childTnLst>
+                              <p:par>
+                                <p:cTn id="21" presetID="1" presetClass="entr" presetSubtype="0" fill="hold" nodeType="clickEffect">
+                                  <p:stCondLst>
+                                    <p:cond delay="0"/>
+                                  </p:stCondLst>
+                                  <p:childTnLst>
+                                    <p:set>
+                                      <p:cBhvr>
+                                        <p:cTn id="22" dur="1" fill="hold">
+                                          <p:stCondLst>
+                                            <p:cond delay="0"/>
+                                          </p:stCondLst>
+                                        </p:cTn>
+                                        <p:tgtEl>
+                                          <p:spTgt spid="4">
+                                            <p:txEl>
+                                              <p:pRg st="4" end="4"/>
+                                            </p:txEl>
+                                          </p:spTgt>
+                                        </p:tgtEl>
+                                        <p:attrNameLst>
+                                          <p:attrName>style.visibility</p:attrName>
+                                        </p:attrNameLst>
+                                      </p:cBhvr>
+                                      <p:to>
+                                        <p:strVal val="visible"/>
+                                      </p:to>
+                                    </p:set>
+                                  </p:childTnLst>
+                                </p:cTn>
+                              </p:par>
+                            </p:childTnLst>
+                          </p:cTn>
+                        </p:par>
+                      </p:childTnLst>
+                    </p:cTn>
+                  </p:par>
+                  <p:par>
+                    <p:cTn id="23" fill="hold">
+                      <p:stCondLst>
+                        <p:cond delay="indefinite"/>
+                      </p:stCondLst>
+                      <p:childTnLst>
+                        <p:par>
+                          <p:cTn id="24" fill="hold">
+                            <p:stCondLst>
+                              <p:cond delay="0"/>
+                            </p:stCondLst>
+                            <p:childTnLst>
+                              <p:par>
+                                <p:cTn id="25" presetID="1" presetClass="entr" presetSubtype="0" fill="hold" nodeType="clickEffect">
+                                  <p:stCondLst>
+                                    <p:cond delay="0"/>
+                                  </p:stCondLst>
+                                  <p:childTnLst>
+                                    <p:set>
+                                      <p:cBhvr>
+                                        <p:cTn id="26" dur="1" fill="hold">
+                                          <p:stCondLst>
+                                            <p:cond delay="0"/>
+                                          </p:stCondLst>
+                                        </p:cTn>
+                                        <p:tgtEl>
+                                          <p:spTgt spid="4">
+                                            <p:txEl>
+                                              <p:pRg st="5" end="5"/>
+                                            </p:txEl>
+                                          </p:spTgt>
+                                        </p:tgtEl>
+                                        <p:attrNameLst>
+                                          <p:attrName>style.visibility</p:attrName>
+                                        </p:attrNameLst>
+                                      </p:cBhvr>
+                                      <p:to>
+                                        <p:strVal val="visible"/>
+                                      </p:to>
+                                    </p:set>
+                                  </p:childTnLst>
+                                </p:cTn>
+                              </p:par>
+                            </p:childTnLst>
+                          </p:cTn>
+                        </p:par>
+                      </p:childTnLst>
+                    </p:cTn>
+                  </p:par>
+                  <p:par>
+                    <p:cTn id="27" fill="hold">
+                      <p:stCondLst>
+                        <p:cond delay="indefinite"/>
+                      </p:stCondLst>
+                      <p:childTnLst>
+                        <p:par>
+                          <p:cTn id="28" fill="hold">
+                            <p:stCondLst>
+                              <p:cond delay="0"/>
+                            </p:stCondLst>
+                            <p:childTnLst>
+                              <p:par>
+                                <p:cTn id="29" presetID="1" presetClass="entr" presetSubtype="0" fill="hold" nodeType="clickEffect">
+                                  <p:stCondLst>
+                                    <p:cond delay="0"/>
+                                  </p:stCondLst>
+                                  <p:childTnLst>
+                                    <p:set>
+                                      <p:cBhvr>
+                                        <p:cTn id="30" dur="1" fill="hold">
+                                          <p:stCondLst>
+                                            <p:cond delay="0"/>
+                                          </p:stCondLst>
+                                        </p:cTn>
+                                        <p:tgtEl>
+                                          <p:spTgt spid="4">
+                                            <p:txEl>
+                                              <p:pRg st="6" end="6"/>
+                                            </p:txEl>
+                                          </p:spTgt>
+                                        </p:tgtEl>
+                                        <p:attrNameLst>
+                                          <p:attrName>style.visibility</p:attrName>
+                                        </p:attrNameLst>
+                                      </p:cBhvr>
+                                      <p:to>
+                                        <p:strVal val="visible"/>
+                                      </p:to>
+                                    </p:set>
+                                  </p:childTnLst>
+                                </p:cTn>
+                              </p:par>
+                            </p:childTnLst>
+                          </p:cTn>
+                        </p:par>
+                      </p:childTnLst>
+                    </p:cTn>
+                  </p:par>
+                  <p:par>
+                    <p:cTn id="31" fill="hold">
+                      <p:stCondLst>
+                        <p:cond delay="indefinite"/>
+                      </p:stCondLst>
+                      <p:childTnLst>
+                        <p:par>
+                          <p:cTn id="32" fill="hold">
+                            <p:stCondLst>
+                              <p:cond delay="0"/>
+                            </p:stCondLst>
+                            <p:childTnLst>
+                              <p:par>
+                                <p:cTn id="33" presetID="1" presetClass="entr" presetSubtype="0" fill="hold" nodeType="clickEffect">
+                                  <p:stCondLst>
+                                    <p:cond delay="0"/>
+                                  </p:stCondLst>
+                                  <p:childTnLst>
+                                    <p:set>
+                                      <p:cBhvr>
+                                        <p:cTn id="34" dur="1" fill="hold">
+                                          <p:stCondLst>
+                                            <p:cond delay="0"/>
+                                          </p:stCondLst>
+                                        </p:cTn>
+                                        <p:tgtEl>
+                                          <p:spTgt spid="4">
+                                            <p:txEl>
+                                              <p:pRg st="7" end="7"/>
+                                            </p:txEl>
+                                          </p:spTgt>
+                                        </p:tgtEl>
+                                        <p:attrNameLst>
+                                          <p:attrName>style.visibility</p:attrName>
+                                        </p:attrNameLst>
+                                      </p:cBhvr>
+                                      <p:to>
+                                        <p:strVal val="visible"/>
+                                      </p:to>
+                                    </p:set>
+                                  </p:childTnLst>
+                                </p:cTn>
+                              </p:par>
+                            </p:childTnLst>
+                          </p:cTn>
+                        </p:par>
+                      </p:childTnLst>
+                    </p:cTn>
+                  </p:par>
+                  <p:par>
+                    <p:cTn id="35" fill="hold">
+                      <p:stCondLst>
+                        <p:cond delay="indefinite"/>
+                      </p:stCondLst>
+                      <p:childTnLst>
+                        <p:par>
+                          <p:cTn id="36" fill="hold">
+                            <p:stCondLst>
+                              <p:cond delay="0"/>
+                            </p:stCondLst>
+                            <p:childTnLst>
+                              <p:par>
+                                <p:cTn id="37" presetID="1" presetClass="entr" presetSubtype="0" fill="hold" nodeType="clickEffect">
+                                  <p:stCondLst>
+                                    <p:cond delay="0"/>
+                                  </p:stCondLst>
+                                  <p:childTnLst>
+                                    <p:set>
+                                      <p:cBhvr>
+                                        <p:cTn id="38" dur="1" fill="hold">
+                                          <p:stCondLst>
+                                            <p:cond delay="0"/>
+                                          </p:stCondLst>
+                                        </p:cTn>
+                                        <p:tgtEl>
+                                          <p:spTgt spid="4">
+                                            <p:txEl>
+                                              <p:pRg st="8" end="8"/>
+                                            </p:txEl>
+                                          </p:spTgt>
+                                        </p:tgtEl>
+                                        <p:attrNameLst>
+                                          <p:attrName>style.visibility</p:attrName>
+                                        </p:attrNameLst>
+                                      </p:cBhvr>
+                                      <p:to>
+                                        <p:strVal val="visible"/>
+                                      </p:to>
+                                    </p:set>
+                                  </p:childTnLst>
+                                </p:cTn>
+                              </p:par>
+                            </p:childTnLst>
+                          </p:cTn>
+                        </p:par>
+                      </p:childTnLst>
+                    </p:cTn>
+                  </p:par>
+                  <p:par>
+                    <p:cTn id="39" fill="hold">
+                      <p:stCondLst>
+                        <p:cond delay="indefinite"/>
+                      </p:stCondLst>
+                      <p:childTnLst>
+                        <p:par>
+                          <p:cTn id="40" fill="hold">
+                            <p:stCondLst>
+                              <p:cond delay="0"/>
+                            </p:stCondLst>
+                            <p:childTnLst>
+                              <p:par>
+                                <p:cTn id="41" presetID="1" presetClass="entr" presetSubtype="0" fill="hold" nodeType="clickEffect">
+                                  <p:stCondLst>
+                                    <p:cond delay="0"/>
+                                  </p:stCondLst>
+                                  <p:childTnLst>
+                                    <p:set>
+                                      <p:cBhvr>
+                                        <p:cTn id="42" dur="1" fill="hold">
+                                          <p:stCondLst>
+                                            <p:cond delay="0"/>
+                                          </p:stCondLst>
+                                        </p:cTn>
+                                        <p:tgtEl>
+                                          <p:spTgt spid="4">
+                                            <p:txEl>
+                                              <p:pRg st="9" end="9"/>
+                                            </p:txEl>
+                                          </p:spTgt>
+                                        </p:tgtEl>
+                                        <p:attrNameLst>
+                                          <p:attrName>style.visibility</p:attrName>
+                                        </p:attrNameLst>
+                                      </p:cBhvr>
+                                      <p:to>
+                                        <p:strVal val="visible"/>
+                                      </p:to>
+                                    </p:set>
+                                  </p:childTnLst>
+                                </p:cTn>
+                              </p:par>
+                            </p:childTnLst>
+                          </p:cTn>
+                        </p:par>
+                      </p:childTnLst>
+                    </p:cTn>
+                  </p:par>
+                  <p:par>
+                    <p:cTn id="43" fill="hold">
+                      <p:stCondLst>
+                        <p:cond delay="indefinite"/>
+                      </p:stCondLst>
+                      <p:childTnLst>
+                        <p:par>
+                          <p:cTn id="44" fill="hold">
+                            <p:stCondLst>
+                              <p:cond delay="0"/>
+                            </p:stCondLst>
+                            <p:childTnLst>
+                              <p:par>
+                                <p:cTn id="45" presetID="1" presetClass="entr" presetSubtype="0" fill="hold" nodeType="clickEffect">
+                                  <p:stCondLst>
+                                    <p:cond delay="0"/>
+                                  </p:stCondLst>
+                                  <p:childTnLst>
+                                    <p:set>
+                                      <p:cBhvr>
+                                        <p:cTn id="46" dur="1" fill="hold">
+                                          <p:stCondLst>
+                                            <p:cond delay="0"/>
+                                          </p:stCondLst>
+                                        </p:cTn>
+                                        <p:tgtEl>
+                                          <p:spTgt spid="4">
+                                            <p:txEl>
+                                              <p:pRg st="10" end="10"/>
+                                            </p:txEl>
+                                          </p:spTgt>
+                                        </p:tgtEl>
+                                        <p:attrNameLst>
+                                          <p:attrName>style.visibility</p:attrName>
+                                        </p:attrNameLst>
+                                      </p:cBhvr>
+                                      <p:to>
+                                        <p:strVal val="visible"/>
+                                      </p:to>
+                                    </p:set>
+                                  </p:childTnLst>
+                                </p:cTn>
+                              </p:par>
+                            </p:childTnLst>
+                          </p:cTn>
+                        </p:par>
+                      </p:childTnLst>
+                    </p:cTn>
+                  </p:par>
+                  <p:par>
+                    <p:cTn id="47" fill="hold">
+                      <p:stCondLst>
+                        <p:cond delay="indefinite"/>
+                      </p:stCondLst>
+                      <p:childTnLst>
+                        <p:par>
+                          <p:cTn id="48" fill="hold">
+                            <p:stCondLst>
+                              <p:cond delay="0"/>
+                            </p:stCondLst>
+                            <p:childTnLst>
+                              <p:par>
+                                <p:cTn id="49" presetID="1" presetClass="entr" presetSubtype="0" fill="hold" nodeType="clickEffect">
+                                  <p:stCondLst>
+                                    <p:cond delay="0"/>
+                                  </p:stCondLst>
+                                  <p:childTnLst>
+                                    <p:set>
+                                      <p:cBhvr>
+                                        <p:cTn id="50" dur="1" fill="hold">
+                                          <p:stCondLst>
+                                            <p:cond delay="0"/>
+                                          </p:stCondLst>
+                                        </p:cTn>
+                                        <p:tgtEl>
+                                          <p:spTgt spid="4">
+                                            <p:txEl>
+                                              <p:pRg st="11" end="11"/>
+                                            </p:txEl>
+                                          </p:spTgt>
+                                        </p:tgtEl>
+                                        <p:attrNameLst>
+                                          <p:attrName>style.visibility</p:attrName>
+                                        </p:attrNameLst>
+                                      </p:cBhvr>
+                                      <p:to>
+                                        <p:strVal val="visible"/>
+                                      </p:to>
+                                    </p:set>
+                                  </p:childTnLst>
+                                </p:cTn>
+                              </p:par>
+                            </p:childTnLst>
+                          </p:cTn>
+                        </p:par>
+                      </p:childTnLst>
+                    </p:cTn>
+                  </p:par>
+                  <p:par>
+                    <p:cTn id="51" fill="hold">
+                      <p:stCondLst>
+                        <p:cond delay="indefinite"/>
+                      </p:stCondLst>
+                      <p:childTnLst>
+                        <p:par>
+                          <p:cTn id="52" fill="hold">
+                            <p:stCondLst>
+                              <p:cond delay="0"/>
+                            </p:stCondLst>
+                            <p:childTnLst>
+                              <p:par>
+                                <p:cTn id="53" presetID="1" presetClass="entr" presetSubtype="0" fill="hold" nodeType="clickEffect">
+                                  <p:stCondLst>
+                                    <p:cond delay="0"/>
+                                  </p:stCondLst>
+                                  <p:childTnLst>
+                                    <p:set>
+                                      <p:cBhvr>
+                                        <p:cTn id="54" dur="1" fill="hold">
+                                          <p:stCondLst>
+                                            <p:cond delay="0"/>
+                                          </p:stCondLst>
+                                        </p:cTn>
+                                        <p:tgtEl>
+                                          <p:spTgt spid="4">
+                                            <p:txEl>
+                                              <p:pRg st="12" end="12"/>
+                                            </p:txEl>
+                                          </p:spTgt>
+                                        </p:tgtEl>
+                                        <p:attrNameLst>
+                                          <p:attrName>style.visibility</p:attrName>
+                                        </p:attrNameLst>
+                                      </p:cBhvr>
+                                      <p:to>
+                                        <p:strVal val="visible"/>
+                                      </p:to>
+                                    </p:set>
+                                  </p:childTnLst>
+                                </p:cTn>
+                              </p:par>
+                            </p:childTnLst>
+                          </p:cTn>
+                        </p:par>
+                      </p:childTnLst>
+                    </p:cTn>
+                  </p:par>
+                </p:childTnLst>
+              </p:cTn>
+              <p:prevCondLst>
+                <p:cond evt="onPrev" delay="0">
+                  <p:tgtEl>
+                    <p:sldTgt/>
+                  </p:tgtEl>
+                </p:cond>
+              </p:prevCondLst>
+              <p:nextCondLst>
+                <p:cond evt="onNext" delay="0">
+                  <p:tgtEl>
+                    <p:sldTgt/>
+                  </p:tgtEl>
+                </p:cond>
+              </p:nextCondLst>
+            </p:seq>
+          </p:childTnLst>
+        </p:cTn>
+      </p:par>
+    </p:tnLst>
+  </p:timing>
+</p:sld>
+</file>
+
 <file path=ppt/slides/slide2.xml><?xml version="1.0" encoding="utf-8"?>
 <p:sld xmlns:a="http://schemas.openxmlformats.org/drawingml/2006/main" xmlns:r="http://schemas.openxmlformats.org/officeDocument/2006/relationships" xmlns:p="http://schemas.openxmlformats.org/presentationml/2006/main">
   <p:cSld>
@@ -11568,6 +13648,1638 @@
                                           <p:spTgt spid="4">
                                             <p:txEl>
                                               <p:pRg st="5" end="5"/>
+                                            </p:txEl>
+                                          </p:spTgt>
+                                        </p:tgtEl>
+                                        <p:attrNameLst>
+                                          <p:attrName>style.visibility</p:attrName>
+                                        </p:attrNameLst>
+                                      </p:cBhvr>
+                                      <p:to>
+                                        <p:strVal val="visible"/>
+                                      </p:to>
+                                    </p:set>
+                                  </p:childTnLst>
+                                </p:cTn>
+                              </p:par>
+                            </p:childTnLst>
+                          </p:cTn>
+                        </p:par>
+                      </p:childTnLst>
+                    </p:cTn>
+                  </p:par>
+                </p:childTnLst>
+              </p:cTn>
+              <p:prevCondLst>
+                <p:cond evt="onPrev" delay="0">
+                  <p:tgtEl>
+                    <p:sldTgt/>
+                  </p:tgtEl>
+                </p:cond>
+              </p:prevCondLst>
+              <p:nextCondLst>
+                <p:cond evt="onNext" delay="0">
+                  <p:tgtEl>
+                    <p:sldTgt/>
+                  </p:tgtEl>
+                </p:cond>
+              </p:nextCondLst>
+            </p:seq>
+          </p:childTnLst>
+        </p:cTn>
+      </p:par>
+    </p:tnLst>
+  </p:timing>
+</p:sld>
+</file>
+
+<file path=ppt/slides/slide20.xml><?xml version="1.0" encoding="utf-8"?>
+<p:sld xmlns:a="http://schemas.openxmlformats.org/drawingml/2006/main" xmlns:r="http://schemas.openxmlformats.org/officeDocument/2006/relationships" xmlns:p="http://schemas.openxmlformats.org/presentationml/2006/main">
+  <p:cSld>
+    <p:spTree>
+      <p:nvGrpSpPr>
+        <p:cNvPr id="1" name="">
+          <a:extLst>
+            <a:ext uri="{FF2B5EF4-FFF2-40B4-BE49-F238E27FC236}">
+              <a16:creationId xmlns:a16="http://schemas.microsoft.com/office/drawing/2014/main" id="{AC206CB2-7FF4-9697-8A10-DA0FBFD59680}"/>
+            </a:ext>
+          </a:extLst>
+        </p:cNvPr>
+        <p:cNvGrpSpPr/>
+        <p:nvPr/>
+      </p:nvGrpSpPr>
+      <p:grpSpPr>
+        <a:xfrm>
+          <a:off x="0" y="0"/>
+          <a:ext cx="0" cy="0"/>
+          <a:chOff x="0" y="0"/>
+          <a:chExt cx="0" cy="0"/>
+        </a:xfrm>
+      </p:grpSpPr>
+      <p:sp>
+        <p:nvSpPr>
+          <p:cNvPr id="3" name="Subtitle 2">
+            <a:extLst>
+              <a:ext uri="{FF2B5EF4-FFF2-40B4-BE49-F238E27FC236}">
+                <a16:creationId xmlns:a16="http://schemas.microsoft.com/office/drawing/2014/main" id="{3B165970-C08F-68DE-CFC9-10F914DBF7EA}"/>
+              </a:ext>
+            </a:extLst>
+          </p:cNvPr>
+          <p:cNvSpPr>
+            <a:spLocks noGrp="1"/>
+          </p:cNvSpPr>
+          <p:nvPr>
+            <p:ph type="subTitle" idx="1"/>
+          </p:nvPr>
+        </p:nvSpPr>
+        <p:spPr>
+          <a:xfrm>
+            <a:off x="152399" y="217488"/>
+            <a:ext cx="11223171" cy="303212"/>
+          </a:xfrm>
+        </p:spPr>
+        <p:txBody>
+          <a:bodyPr>
+            <a:normAutofit fontScale="92500" lnSpcReduction="20000"/>
+          </a:bodyPr>
+          <a:lstStyle/>
+          <a:p>
+            <a:r>
+              <a:rPr lang="en-US" sz="1800" b="1"/>
+              <a:t>Creating Abstract class – Extending an abstract class</a:t>
+            </a:r>
+          </a:p>
+        </p:txBody>
+      </p:sp>
+      <p:sp>
+        <p:nvSpPr>
+          <p:cNvPr id="4" name="Subtitle 2">
+            <a:extLst>
+              <a:ext uri="{FF2B5EF4-FFF2-40B4-BE49-F238E27FC236}">
+                <a16:creationId xmlns:a16="http://schemas.microsoft.com/office/drawing/2014/main" id="{BEED27DC-F522-E0A8-1C39-FFEC4836CA6B}"/>
+              </a:ext>
+            </a:extLst>
+          </p:cNvPr>
+          <p:cNvSpPr txBox="1">
+            <a:spLocks/>
+          </p:cNvSpPr>
+          <p:nvPr/>
+        </p:nvSpPr>
+        <p:spPr>
+          <a:xfrm>
+            <a:off x="0" y="820738"/>
+            <a:ext cx="12192000" cy="6037262"/>
+          </a:xfrm>
+          <a:prstGeom prst="rect">
+            <a:avLst/>
+          </a:prstGeom>
+        </p:spPr>
+        <p:txBody>
+          <a:bodyPr vert="horz" lIns="91440" tIns="45720" rIns="91440" bIns="45720" rtlCol="0">
+            <a:normAutofit/>
+          </a:bodyPr>
+          <a:lstStyle>
+            <a:lvl1pPr marL="0" indent="0" algn="ctr" defTabSz="914400" rtl="0" eaLnBrk="1" latinLnBrk="0" hangingPunct="1">
+              <a:lnSpc>
+                <a:spcPct val="90000"/>
+              </a:lnSpc>
+              <a:spcBef>
+                <a:spcPts val="1000"/>
+              </a:spcBef>
+              <a:buFont typeface="Arial" panose="020B0604020202020204" pitchFamily="34" charset="0"/>
+              <a:buNone/>
+              <a:defRPr sz="2400" kern="1200">
+                <a:solidFill>
+                  <a:schemeClr val="tx1"/>
+                </a:solidFill>
+                <a:latin typeface="+mn-lt"/>
+                <a:ea typeface="+mn-ea"/>
+                <a:cs typeface="+mn-cs"/>
+              </a:defRPr>
+            </a:lvl1pPr>
+            <a:lvl2pPr marL="457200" indent="0" algn="ctr" defTabSz="914400" rtl="0" eaLnBrk="1" latinLnBrk="0" hangingPunct="1">
+              <a:lnSpc>
+                <a:spcPct val="90000"/>
+              </a:lnSpc>
+              <a:spcBef>
+                <a:spcPts val="500"/>
+              </a:spcBef>
+              <a:buFont typeface="Arial" panose="020B0604020202020204" pitchFamily="34" charset="0"/>
+              <a:buNone/>
+              <a:defRPr sz="2000" kern="1200">
+                <a:solidFill>
+                  <a:schemeClr val="tx1"/>
+                </a:solidFill>
+                <a:latin typeface="+mn-lt"/>
+                <a:ea typeface="+mn-ea"/>
+                <a:cs typeface="+mn-cs"/>
+              </a:defRPr>
+            </a:lvl2pPr>
+            <a:lvl3pPr marL="914400" indent="0" algn="ctr" defTabSz="914400" rtl="0" eaLnBrk="1" latinLnBrk="0" hangingPunct="1">
+              <a:lnSpc>
+                <a:spcPct val="90000"/>
+              </a:lnSpc>
+              <a:spcBef>
+                <a:spcPts val="500"/>
+              </a:spcBef>
+              <a:buFont typeface="Arial" panose="020B0604020202020204" pitchFamily="34" charset="0"/>
+              <a:buNone/>
+              <a:defRPr sz="1800" kern="1200">
+                <a:solidFill>
+                  <a:schemeClr val="tx1"/>
+                </a:solidFill>
+                <a:latin typeface="+mn-lt"/>
+                <a:ea typeface="+mn-ea"/>
+                <a:cs typeface="+mn-cs"/>
+              </a:defRPr>
+            </a:lvl3pPr>
+            <a:lvl4pPr marL="1371600" indent="0" algn="ctr" defTabSz="914400" rtl="0" eaLnBrk="1" latinLnBrk="0" hangingPunct="1">
+              <a:lnSpc>
+                <a:spcPct val="90000"/>
+              </a:lnSpc>
+              <a:spcBef>
+                <a:spcPts val="500"/>
+              </a:spcBef>
+              <a:buFont typeface="Arial" panose="020B0604020202020204" pitchFamily="34" charset="0"/>
+              <a:buNone/>
+              <a:defRPr sz="1600" kern="1200">
+                <a:solidFill>
+                  <a:schemeClr val="tx1"/>
+                </a:solidFill>
+                <a:latin typeface="+mn-lt"/>
+                <a:ea typeface="+mn-ea"/>
+                <a:cs typeface="+mn-cs"/>
+              </a:defRPr>
+            </a:lvl4pPr>
+            <a:lvl5pPr marL="1828800" indent="0" algn="ctr" defTabSz="914400" rtl="0" eaLnBrk="1" latinLnBrk="0" hangingPunct="1">
+              <a:lnSpc>
+                <a:spcPct val="90000"/>
+              </a:lnSpc>
+              <a:spcBef>
+                <a:spcPts val="500"/>
+              </a:spcBef>
+              <a:buFont typeface="Arial" panose="020B0604020202020204" pitchFamily="34" charset="0"/>
+              <a:buNone/>
+              <a:defRPr sz="1600" kern="1200">
+                <a:solidFill>
+                  <a:schemeClr val="tx1"/>
+                </a:solidFill>
+                <a:latin typeface="+mn-lt"/>
+                <a:ea typeface="+mn-ea"/>
+                <a:cs typeface="+mn-cs"/>
+              </a:defRPr>
+            </a:lvl5pPr>
+            <a:lvl6pPr marL="2286000" indent="0" algn="ctr" defTabSz="914400" rtl="0" eaLnBrk="1" latinLnBrk="0" hangingPunct="1">
+              <a:lnSpc>
+                <a:spcPct val="90000"/>
+              </a:lnSpc>
+              <a:spcBef>
+                <a:spcPts val="500"/>
+              </a:spcBef>
+              <a:buFont typeface="Arial" panose="020B0604020202020204" pitchFamily="34" charset="0"/>
+              <a:buNone/>
+              <a:defRPr sz="1600" kern="1200">
+                <a:solidFill>
+                  <a:schemeClr val="tx1"/>
+                </a:solidFill>
+                <a:latin typeface="+mn-lt"/>
+                <a:ea typeface="+mn-ea"/>
+                <a:cs typeface="+mn-cs"/>
+              </a:defRPr>
+            </a:lvl6pPr>
+            <a:lvl7pPr marL="2743200" indent="0" algn="ctr" defTabSz="914400" rtl="0" eaLnBrk="1" latinLnBrk="0" hangingPunct="1">
+              <a:lnSpc>
+                <a:spcPct val="90000"/>
+              </a:lnSpc>
+              <a:spcBef>
+                <a:spcPts val="500"/>
+              </a:spcBef>
+              <a:buFont typeface="Arial" panose="020B0604020202020204" pitchFamily="34" charset="0"/>
+              <a:buNone/>
+              <a:defRPr sz="1600" kern="1200">
+                <a:solidFill>
+                  <a:schemeClr val="tx1"/>
+                </a:solidFill>
+                <a:latin typeface="+mn-lt"/>
+                <a:ea typeface="+mn-ea"/>
+                <a:cs typeface="+mn-cs"/>
+              </a:defRPr>
+            </a:lvl7pPr>
+            <a:lvl8pPr marL="3200400" indent="0" algn="ctr" defTabSz="914400" rtl="0" eaLnBrk="1" latinLnBrk="0" hangingPunct="1">
+              <a:lnSpc>
+                <a:spcPct val="90000"/>
+              </a:lnSpc>
+              <a:spcBef>
+                <a:spcPts val="500"/>
+              </a:spcBef>
+              <a:buFont typeface="Arial" panose="020B0604020202020204" pitchFamily="34" charset="0"/>
+              <a:buNone/>
+              <a:defRPr sz="1600" kern="1200">
+                <a:solidFill>
+                  <a:schemeClr val="tx1"/>
+                </a:solidFill>
+                <a:latin typeface="+mn-lt"/>
+                <a:ea typeface="+mn-ea"/>
+                <a:cs typeface="+mn-cs"/>
+              </a:defRPr>
+            </a:lvl8pPr>
+            <a:lvl9pPr marL="3657600" indent="0" algn="ctr" defTabSz="914400" rtl="0" eaLnBrk="1" latinLnBrk="0" hangingPunct="1">
+              <a:lnSpc>
+                <a:spcPct val="90000"/>
+              </a:lnSpc>
+              <a:spcBef>
+                <a:spcPts val="500"/>
+              </a:spcBef>
+              <a:buFont typeface="Arial" panose="020B0604020202020204" pitchFamily="34" charset="0"/>
+              <a:buNone/>
+              <a:defRPr sz="1600" kern="1200">
+                <a:solidFill>
+                  <a:schemeClr val="tx1"/>
+                </a:solidFill>
+                <a:latin typeface="+mn-lt"/>
+                <a:ea typeface="+mn-ea"/>
+                <a:cs typeface="+mn-cs"/>
+              </a:defRPr>
+            </a:lvl9pPr>
+          </a:lstStyle>
+          <a:p>
+            <a:pPr algn="l"/>
+            <a:r>
+              <a:rPr lang="en-US" sz="1800">
+                <a:sym typeface="Wingdings" pitchFamily="2" charset="2"/>
+              </a:rPr>
+              <a:t>(code illustration snippet 32)</a:t>
+            </a:r>
+          </a:p>
+          <a:p>
+            <a:pPr algn="l"/>
+            <a:r>
+              <a:rPr lang="en-US" sz="1800">
+                <a:sym typeface="Wingdings" pitchFamily="2" charset="2"/>
+              </a:rPr>
+              <a:t>- An ... abstract class can ... other ... abstract class =&gt; When we doing this, the ... abstract class won't need to ... the ... on the ... abstract class</a:t>
+            </a:r>
+          </a:p>
+          <a:p>
+            <a:pPr algn="l"/>
+            <a:r>
+              <a:rPr lang="en-US" sz="1800">
+                <a:sym typeface="Wingdings" pitchFamily="2" charset="2"/>
+              </a:rPr>
+              <a:t>– If there are any concrete ... that ... the ... abstract class =&gt; that concrete ... will have to ... from both ...</a:t>
+            </a:r>
+          </a:p>
+          <a:p>
+            <a:pPr algn="l"/>
+            <a:r>
+              <a:rPr lang="en-US" sz="1800">
+                <a:sym typeface="Wingdings" pitchFamily="2" charset="2"/>
+              </a:rPr>
+              <a:t>(code illustration snippet 33) </a:t>
+            </a:r>
+          </a:p>
+          <a:p>
+            <a:pPr algn="l"/>
+            <a:r>
+              <a:rPr lang="en-US" sz="1800">
+                <a:sym typeface="Wingdings" pitchFamily="2" charset="2"/>
+              </a:rPr>
+              <a:t>- However, there are 1 .... If all ... from parent abstract class that has been ... by the sub-abstract class =&gt; the concrete class won't have to ... </a:t>
+            </a:r>
+          </a:p>
+          <a:p>
+            <a:pPr algn="l"/>
+            <a:r>
+              <a:rPr lang="en-US" sz="1800">
+                <a:sym typeface="Wingdings" pitchFamily="2" charset="2"/>
+              </a:rPr>
+              <a:t>(code illustration snippet 34) </a:t>
+            </a:r>
+          </a:p>
+          <a:p>
+            <a:pPr algn="l"/>
+            <a:r>
+              <a:rPr lang="en-US" sz="1800">
+                <a:sym typeface="Wingdings" pitchFamily="2" charset="2"/>
+              </a:rPr>
+              <a:t>- The reason for this is because when the ... abstract class ... the method from the ... abstract class =&gt; When a concrete class .. the ... abstract class =&gt; the method that the ... class ... down will be the ... version not the ... version</a:t>
+            </a:r>
+          </a:p>
+          <a:p>
+            <a:pPr algn="l"/>
+            <a:r>
+              <a:rPr lang="en-US" sz="1800">
+                <a:sym typeface="Wingdings" pitchFamily="2" charset="2"/>
+              </a:rPr>
+              <a:t>- Rules for Abstract class: </a:t>
+            </a:r>
+          </a:p>
+          <a:p>
+            <a:pPr algn="l"/>
+            <a:r>
+              <a:rPr lang="en-US" sz="1800">
+                <a:sym typeface="Wingdings" pitchFamily="2" charset="2"/>
+              </a:rPr>
+              <a:t>+) ... (Ask question , Q7 – also check package part1.q7)</a:t>
+            </a:r>
+          </a:p>
+          <a:p>
+            <a:pPr algn="l"/>
+            <a:r>
+              <a:rPr lang="en-US" sz="1800">
+                <a:sym typeface="Wingdings" pitchFamily="2" charset="2"/>
+              </a:rPr>
+              <a:t>+) ... </a:t>
+            </a:r>
+          </a:p>
+          <a:p>
+            <a:pPr algn="l"/>
+            <a:r>
+              <a:rPr lang="en-US" sz="1800">
+                <a:sym typeface="Wingdings" pitchFamily="2" charset="2"/>
+              </a:rPr>
+              <a:t>+) ... </a:t>
+            </a:r>
+          </a:p>
+          <a:p>
+            <a:pPr algn="l"/>
+            <a:r>
+              <a:rPr lang="en-US" sz="1800">
+                <a:sym typeface="Wingdings" pitchFamily="2" charset="2"/>
+              </a:rPr>
+              <a:t>+) ... </a:t>
+            </a:r>
+          </a:p>
+          <a:p>
+            <a:pPr algn="l"/>
+            <a:r>
+              <a:rPr lang="en-US" sz="1800">
+                <a:sym typeface="Wingdings" pitchFamily="2" charset="2"/>
+              </a:rPr>
+              <a:t>+) ... </a:t>
+            </a:r>
+          </a:p>
+        </p:txBody>
+      </p:sp>
+    </p:spTree>
+    <p:extLst>
+      <p:ext uri="{BB962C8B-B14F-4D97-AF65-F5344CB8AC3E}">
+        <p14:creationId xmlns:p14="http://schemas.microsoft.com/office/powerpoint/2010/main" val="4151776277"/>
+      </p:ext>
+    </p:extLst>
+  </p:cSld>
+  <p:clrMapOvr>
+    <a:masterClrMapping/>
+  </p:clrMapOvr>
+  <p:timing>
+    <p:tnLst>
+      <p:par>
+        <p:cTn id="1" dur="indefinite" restart="never" nodeType="tmRoot">
+          <p:childTnLst>
+            <p:seq concurrent="1" nextAc="seek">
+              <p:cTn id="2" dur="indefinite" nodeType="mainSeq">
+                <p:childTnLst>
+                  <p:par>
+                    <p:cTn id="3" fill="hold">
+                      <p:stCondLst>
+                        <p:cond delay="indefinite"/>
+                      </p:stCondLst>
+                      <p:childTnLst>
+                        <p:par>
+                          <p:cTn id="4" fill="hold">
+                            <p:stCondLst>
+                              <p:cond delay="0"/>
+                            </p:stCondLst>
+                            <p:childTnLst>
+                              <p:par>
+                                <p:cTn id="5" presetID="1" presetClass="entr" presetSubtype="0" fill="hold" nodeType="clickEffect">
+                                  <p:stCondLst>
+                                    <p:cond delay="0"/>
+                                  </p:stCondLst>
+                                  <p:childTnLst>
+                                    <p:set>
+                                      <p:cBhvr>
+                                        <p:cTn id="6" dur="1" fill="hold">
+                                          <p:stCondLst>
+                                            <p:cond delay="0"/>
+                                          </p:stCondLst>
+                                        </p:cTn>
+                                        <p:tgtEl>
+                                          <p:spTgt spid="4">
+                                            <p:txEl>
+                                              <p:pRg st="0" end="0"/>
+                                            </p:txEl>
+                                          </p:spTgt>
+                                        </p:tgtEl>
+                                        <p:attrNameLst>
+                                          <p:attrName>style.visibility</p:attrName>
+                                        </p:attrNameLst>
+                                      </p:cBhvr>
+                                      <p:to>
+                                        <p:strVal val="visible"/>
+                                      </p:to>
+                                    </p:set>
+                                  </p:childTnLst>
+                                </p:cTn>
+                              </p:par>
+                            </p:childTnLst>
+                          </p:cTn>
+                        </p:par>
+                      </p:childTnLst>
+                    </p:cTn>
+                  </p:par>
+                  <p:par>
+                    <p:cTn id="7" fill="hold">
+                      <p:stCondLst>
+                        <p:cond delay="indefinite"/>
+                      </p:stCondLst>
+                      <p:childTnLst>
+                        <p:par>
+                          <p:cTn id="8" fill="hold">
+                            <p:stCondLst>
+                              <p:cond delay="0"/>
+                            </p:stCondLst>
+                            <p:childTnLst>
+                              <p:par>
+                                <p:cTn id="9" presetID="1" presetClass="entr" presetSubtype="0" fill="hold" nodeType="clickEffect">
+                                  <p:stCondLst>
+                                    <p:cond delay="0"/>
+                                  </p:stCondLst>
+                                  <p:childTnLst>
+                                    <p:set>
+                                      <p:cBhvr>
+                                        <p:cTn id="10" dur="1" fill="hold">
+                                          <p:stCondLst>
+                                            <p:cond delay="0"/>
+                                          </p:stCondLst>
+                                        </p:cTn>
+                                        <p:tgtEl>
+                                          <p:spTgt spid="4">
+                                            <p:txEl>
+                                              <p:pRg st="1" end="1"/>
+                                            </p:txEl>
+                                          </p:spTgt>
+                                        </p:tgtEl>
+                                        <p:attrNameLst>
+                                          <p:attrName>style.visibility</p:attrName>
+                                        </p:attrNameLst>
+                                      </p:cBhvr>
+                                      <p:to>
+                                        <p:strVal val="visible"/>
+                                      </p:to>
+                                    </p:set>
+                                  </p:childTnLst>
+                                </p:cTn>
+                              </p:par>
+                            </p:childTnLst>
+                          </p:cTn>
+                        </p:par>
+                      </p:childTnLst>
+                    </p:cTn>
+                  </p:par>
+                  <p:par>
+                    <p:cTn id="11" fill="hold">
+                      <p:stCondLst>
+                        <p:cond delay="indefinite"/>
+                      </p:stCondLst>
+                      <p:childTnLst>
+                        <p:par>
+                          <p:cTn id="12" fill="hold">
+                            <p:stCondLst>
+                              <p:cond delay="0"/>
+                            </p:stCondLst>
+                            <p:childTnLst>
+                              <p:par>
+                                <p:cTn id="13" presetID="1" presetClass="entr" presetSubtype="0" fill="hold" nodeType="clickEffect">
+                                  <p:stCondLst>
+                                    <p:cond delay="0"/>
+                                  </p:stCondLst>
+                                  <p:childTnLst>
+                                    <p:set>
+                                      <p:cBhvr>
+                                        <p:cTn id="14" dur="1" fill="hold">
+                                          <p:stCondLst>
+                                            <p:cond delay="0"/>
+                                          </p:stCondLst>
+                                        </p:cTn>
+                                        <p:tgtEl>
+                                          <p:spTgt spid="4">
+                                            <p:txEl>
+                                              <p:pRg st="2" end="2"/>
+                                            </p:txEl>
+                                          </p:spTgt>
+                                        </p:tgtEl>
+                                        <p:attrNameLst>
+                                          <p:attrName>style.visibility</p:attrName>
+                                        </p:attrNameLst>
+                                      </p:cBhvr>
+                                      <p:to>
+                                        <p:strVal val="visible"/>
+                                      </p:to>
+                                    </p:set>
+                                  </p:childTnLst>
+                                </p:cTn>
+                              </p:par>
+                            </p:childTnLst>
+                          </p:cTn>
+                        </p:par>
+                      </p:childTnLst>
+                    </p:cTn>
+                  </p:par>
+                  <p:par>
+                    <p:cTn id="15" fill="hold">
+                      <p:stCondLst>
+                        <p:cond delay="indefinite"/>
+                      </p:stCondLst>
+                      <p:childTnLst>
+                        <p:par>
+                          <p:cTn id="16" fill="hold">
+                            <p:stCondLst>
+                              <p:cond delay="0"/>
+                            </p:stCondLst>
+                            <p:childTnLst>
+                              <p:par>
+                                <p:cTn id="17" presetID="1" presetClass="entr" presetSubtype="0" fill="hold" nodeType="clickEffect">
+                                  <p:stCondLst>
+                                    <p:cond delay="0"/>
+                                  </p:stCondLst>
+                                  <p:childTnLst>
+                                    <p:set>
+                                      <p:cBhvr>
+                                        <p:cTn id="18" dur="1" fill="hold">
+                                          <p:stCondLst>
+                                            <p:cond delay="0"/>
+                                          </p:stCondLst>
+                                        </p:cTn>
+                                        <p:tgtEl>
+                                          <p:spTgt spid="4">
+                                            <p:txEl>
+                                              <p:pRg st="3" end="3"/>
+                                            </p:txEl>
+                                          </p:spTgt>
+                                        </p:tgtEl>
+                                        <p:attrNameLst>
+                                          <p:attrName>style.visibility</p:attrName>
+                                        </p:attrNameLst>
+                                      </p:cBhvr>
+                                      <p:to>
+                                        <p:strVal val="visible"/>
+                                      </p:to>
+                                    </p:set>
+                                  </p:childTnLst>
+                                </p:cTn>
+                              </p:par>
+                            </p:childTnLst>
+                          </p:cTn>
+                        </p:par>
+                      </p:childTnLst>
+                    </p:cTn>
+                  </p:par>
+                  <p:par>
+                    <p:cTn id="19" fill="hold">
+                      <p:stCondLst>
+                        <p:cond delay="indefinite"/>
+                      </p:stCondLst>
+                      <p:childTnLst>
+                        <p:par>
+                          <p:cTn id="20" fill="hold">
+                            <p:stCondLst>
+                              <p:cond delay="0"/>
+                            </p:stCondLst>
+                            <p:childTnLst>
+                              <p:par>
+                                <p:cTn id="21" presetID="1" presetClass="entr" presetSubtype="0" fill="hold" nodeType="clickEffect">
+                                  <p:stCondLst>
+                                    <p:cond delay="0"/>
+                                  </p:stCondLst>
+                                  <p:childTnLst>
+                                    <p:set>
+                                      <p:cBhvr>
+                                        <p:cTn id="22" dur="1" fill="hold">
+                                          <p:stCondLst>
+                                            <p:cond delay="0"/>
+                                          </p:stCondLst>
+                                        </p:cTn>
+                                        <p:tgtEl>
+                                          <p:spTgt spid="4">
+                                            <p:txEl>
+                                              <p:pRg st="4" end="4"/>
+                                            </p:txEl>
+                                          </p:spTgt>
+                                        </p:tgtEl>
+                                        <p:attrNameLst>
+                                          <p:attrName>style.visibility</p:attrName>
+                                        </p:attrNameLst>
+                                      </p:cBhvr>
+                                      <p:to>
+                                        <p:strVal val="visible"/>
+                                      </p:to>
+                                    </p:set>
+                                  </p:childTnLst>
+                                </p:cTn>
+                              </p:par>
+                            </p:childTnLst>
+                          </p:cTn>
+                        </p:par>
+                      </p:childTnLst>
+                    </p:cTn>
+                  </p:par>
+                  <p:par>
+                    <p:cTn id="23" fill="hold">
+                      <p:stCondLst>
+                        <p:cond delay="indefinite"/>
+                      </p:stCondLst>
+                      <p:childTnLst>
+                        <p:par>
+                          <p:cTn id="24" fill="hold">
+                            <p:stCondLst>
+                              <p:cond delay="0"/>
+                            </p:stCondLst>
+                            <p:childTnLst>
+                              <p:par>
+                                <p:cTn id="25" presetID="1" presetClass="entr" presetSubtype="0" fill="hold" nodeType="clickEffect">
+                                  <p:stCondLst>
+                                    <p:cond delay="0"/>
+                                  </p:stCondLst>
+                                  <p:childTnLst>
+                                    <p:set>
+                                      <p:cBhvr>
+                                        <p:cTn id="26" dur="1" fill="hold">
+                                          <p:stCondLst>
+                                            <p:cond delay="0"/>
+                                          </p:stCondLst>
+                                        </p:cTn>
+                                        <p:tgtEl>
+                                          <p:spTgt spid="4">
+                                            <p:txEl>
+                                              <p:pRg st="5" end="5"/>
+                                            </p:txEl>
+                                          </p:spTgt>
+                                        </p:tgtEl>
+                                        <p:attrNameLst>
+                                          <p:attrName>style.visibility</p:attrName>
+                                        </p:attrNameLst>
+                                      </p:cBhvr>
+                                      <p:to>
+                                        <p:strVal val="visible"/>
+                                      </p:to>
+                                    </p:set>
+                                  </p:childTnLst>
+                                </p:cTn>
+                              </p:par>
+                            </p:childTnLst>
+                          </p:cTn>
+                        </p:par>
+                      </p:childTnLst>
+                    </p:cTn>
+                  </p:par>
+                  <p:par>
+                    <p:cTn id="27" fill="hold">
+                      <p:stCondLst>
+                        <p:cond delay="indefinite"/>
+                      </p:stCondLst>
+                      <p:childTnLst>
+                        <p:par>
+                          <p:cTn id="28" fill="hold">
+                            <p:stCondLst>
+                              <p:cond delay="0"/>
+                            </p:stCondLst>
+                            <p:childTnLst>
+                              <p:par>
+                                <p:cTn id="29" presetID="1" presetClass="entr" presetSubtype="0" fill="hold" nodeType="clickEffect">
+                                  <p:stCondLst>
+                                    <p:cond delay="0"/>
+                                  </p:stCondLst>
+                                  <p:childTnLst>
+                                    <p:set>
+                                      <p:cBhvr>
+                                        <p:cTn id="30" dur="1" fill="hold">
+                                          <p:stCondLst>
+                                            <p:cond delay="0"/>
+                                          </p:stCondLst>
+                                        </p:cTn>
+                                        <p:tgtEl>
+                                          <p:spTgt spid="4">
+                                            <p:txEl>
+                                              <p:pRg st="6" end="6"/>
+                                            </p:txEl>
+                                          </p:spTgt>
+                                        </p:tgtEl>
+                                        <p:attrNameLst>
+                                          <p:attrName>style.visibility</p:attrName>
+                                        </p:attrNameLst>
+                                      </p:cBhvr>
+                                      <p:to>
+                                        <p:strVal val="visible"/>
+                                      </p:to>
+                                    </p:set>
+                                  </p:childTnLst>
+                                </p:cTn>
+                              </p:par>
+                            </p:childTnLst>
+                          </p:cTn>
+                        </p:par>
+                      </p:childTnLst>
+                    </p:cTn>
+                  </p:par>
+                  <p:par>
+                    <p:cTn id="31" fill="hold">
+                      <p:stCondLst>
+                        <p:cond delay="indefinite"/>
+                      </p:stCondLst>
+                      <p:childTnLst>
+                        <p:par>
+                          <p:cTn id="32" fill="hold">
+                            <p:stCondLst>
+                              <p:cond delay="0"/>
+                            </p:stCondLst>
+                            <p:childTnLst>
+                              <p:par>
+                                <p:cTn id="33" presetID="1" presetClass="entr" presetSubtype="0" fill="hold" nodeType="clickEffect">
+                                  <p:stCondLst>
+                                    <p:cond delay="0"/>
+                                  </p:stCondLst>
+                                  <p:childTnLst>
+                                    <p:set>
+                                      <p:cBhvr>
+                                        <p:cTn id="34" dur="1" fill="hold">
+                                          <p:stCondLst>
+                                            <p:cond delay="0"/>
+                                          </p:stCondLst>
+                                        </p:cTn>
+                                        <p:tgtEl>
+                                          <p:spTgt spid="4">
+                                            <p:txEl>
+                                              <p:pRg st="7" end="7"/>
+                                            </p:txEl>
+                                          </p:spTgt>
+                                        </p:tgtEl>
+                                        <p:attrNameLst>
+                                          <p:attrName>style.visibility</p:attrName>
+                                        </p:attrNameLst>
+                                      </p:cBhvr>
+                                      <p:to>
+                                        <p:strVal val="visible"/>
+                                      </p:to>
+                                    </p:set>
+                                  </p:childTnLst>
+                                </p:cTn>
+                              </p:par>
+                            </p:childTnLst>
+                          </p:cTn>
+                        </p:par>
+                      </p:childTnLst>
+                    </p:cTn>
+                  </p:par>
+                  <p:par>
+                    <p:cTn id="35" fill="hold">
+                      <p:stCondLst>
+                        <p:cond delay="indefinite"/>
+                      </p:stCondLst>
+                      <p:childTnLst>
+                        <p:par>
+                          <p:cTn id="36" fill="hold">
+                            <p:stCondLst>
+                              <p:cond delay="0"/>
+                            </p:stCondLst>
+                            <p:childTnLst>
+                              <p:par>
+                                <p:cTn id="37" presetID="1" presetClass="entr" presetSubtype="0" fill="hold" nodeType="clickEffect">
+                                  <p:stCondLst>
+                                    <p:cond delay="0"/>
+                                  </p:stCondLst>
+                                  <p:childTnLst>
+                                    <p:set>
+                                      <p:cBhvr>
+                                        <p:cTn id="38" dur="1" fill="hold">
+                                          <p:stCondLst>
+                                            <p:cond delay="0"/>
+                                          </p:stCondLst>
+                                        </p:cTn>
+                                        <p:tgtEl>
+                                          <p:spTgt spid="4">
+                                            <p:txEl>
+                                              <p:pRg st="8" end="8"/>
+                                            </p:txEl>
+                                          </p:spTgt>
+                                        </p:tgtEl>
+                                        <p:attrNameLst>
+                                          <p:attrName>style.visibility</p:attrName>
+                                        </p:attrNameLst>
+                                      </p:cBhvr>
+                                      <p:to>
+                                        <p:strVal val="visible"/>
+                                      </p:to>
+                                    </p:set>
+                                  </p:childTnLst>
+                                </p:cTn>
+                              </p:par>
+                            </p:childTnLst>
+                          </p:cTn>
+                        </p:par>
+                      </p:childTnLst>
+                    </p:cTn>
+                  </p:par>
+                  <p:par>
+                    <p:cTn id="39" fill="hold">
+                      <p:stCondLst>
+                        <p:cond delay="indefinite"/>
+                      </p:stCondLst>
+                      <p:childTnLst>
+                        <p:par>
+                          <p:cTn id="40" fill="hold">
+                            <p:stCondLst>
+                              <p:cond delay="0"/>
+                            </p:stCondLst>
+                            <p:childTnLst>
+                              <p:par>
+                                <p:cTn id="41" presetID="1" presetClass="entr" presetSubtype="0" fill="hold" nodeType="clickEffect">
+                                  <p:stCondLst>
+                                    <p:cond delay="0"/>
+                                  </p:stCondLst>
+                                  <p:childTnLst>
+                                    <p:set>
+                                      <p:cBhvr>
+                                        <p:cTn id="42" dur="1" fill="hold">
+                                          <p:stCondLst>
+                                            <p:cond delay="0"/>
+                                          </p:stCondLst>
+                                        </p:cTn>
+                                        <p:tgtEl>
+                                          <p:spTgt spid="4">
+                                            <p:txEl>
+                                              <p:pRg st="9" end="9"/>
+                                            </p:txEl>
+                                          </p:spTgt>
+                                        </p:tgtEl>
+                                        <p:attrNameLst>
+                                          <p:attrName>style.visibility</p:attrName>
+                                        </p:attrNameLst>
+                                      </p:cBhvr>
+                                      <p:to>
+                                        <p:strVal val="visible"/>
+                                      </p:to>
+                                    </p:set>
+                                  </p:childTnLst>
+                                </p:cTn>
+                              </p:par>
+                            </p:childTnLst>
+                          </p:cTn>
+                        </p:par>
+                      </p:childTnLst>
+                    </p:cTn>
+                  </p:par>
+                  <p:par>
+                    <p:cTn id="43" fill="hold">
+                      <p:stCondLst>
+                        <p:cond delay="indefinite"/>
+                      </p:stCondLst>
+                      <p:childTnLst>
+                        <p:par>
+                          <p:cTn id="44" fill="hold">
+                            <p:stCondLst>
+                              <p:cond delay="0"/>
+                            </p:stCondLst>
+                            <p:childTnLst>
+                              <p:par>
+                                <p:cTn id="45" presetID="1" presetClass="entr" presetSubtype="0" fill="hold" nodeType="clickEffect">
+                                  <p:stCondLst>
+                                    <p:cond delay="0"/>
+                                  </p:stCondLst>
+                                  <p:childTnLst>
+                                    <p:set>
+                                      <p:cBhvr>
+                                        <p:cTn id="46" dur="1" fill="hold">
+                                          <p:stCondLst>
+                                            <p:cond delay="0"/>
+                                          </p:stCondLst>
+                                        </p:cTn>
+                                        <p:tgtEl>
+                                          <p:spTgt spid="4">
+                                            <p:txEl>
+                                              <p:pRg st="10" end="10"/>
+                                            </p:txEl>
+                                          </p:spTgt>
+                                        </p:tgtEl>
+                                        <p:attrNameLst>
+                                          <p:attrName>style.visibility</p:attrName>
+                                        </p:attrNameLst>
+                                      </p:cBhvr>
+                                      <p:to>
+                                        <p:strVal val="visible"/>
+                                      </p:to>
+                                    </p:set>
+                                  </p:childTnLst>
+                                </p:cTn>
+                              </p:par>
+                            </p:childTnLst>
+                          </p:cTn>
+                        </p:par>
+                      </p:childTnLst>
+                    </p:cTn>
+                  </p:par>
+                  <p:par>
+                    <p:cTn id="47" fill="hold">
+                      <p:stCondLst>
+                        <p:cond delay="indefinite"/>
+                      </p:stCondLst>
+                      <p:childTnLst>
+                        <p:par>
+                          <p:cTn id="48" fill="hold">
+                            <p:stCondLst>
+                              <p:cond delay="0"/>
+                            </p:stCondLst>
+                            <p:childTnLst>
+                              <p:par>
+                                <p:cTn id="49" presetID="1" presetClass="entr" presetSubtype="0" fill="hold" nodeType="clickEffect">
+                                  <p:stCondLst>
+                                    <p:cond delay="0"/>
+                                  </p:stCondLst>
+                                  <p:childTnLst>
+                                    <p:set>
+                                      <p:cBhvr>
+                                        <p:cTn id="50" dur="1" fill="hold">
+                                          <p:stCondLst>
+                                            <p:cond delay="0"/>
+                                          </p:stCondLst>
+                                        </p:cTn>
+                                        <p:tgtEl>
+                                          <p:spTgt spid="4">
+                                            <p:txEl>
+                                              <p:pRg st="11" end="11"/>
+                                            </p:txEl>
+                                          </p:spTgt>
+                                        </p:tgtEl>
+                                        <p:attrNameLst>
+                                          <p:attrName>style.visibility</p:attrName>
+                                        </p:attrNameLst>
+                                      </p:cBhvr>
+                                      <p:to>
+                                        <p:strVal val="visible"/>
+                                      </p:to>
+                                    </p:set>
+                                  </p:childTnLst>
+                                </p:cTn>
+                              </p:par>
+                            </p:childTnLst>
+                          </p:cTn>
+                        </p:par>
+                      </p:childTnLst>
+                    </p:cTn>
+                  </p:par>
+                  <p:par>
+                    <p:cTn id="51" fill="hold">
+                      <p:stCondLst>
+                        <p:cond delay="indefinite"/>
+                      </p:stCondLst>
+                      <p:childTnLst>
+                        <p:par>
+                          <p:cTn id="52" fill="hold">
+                            <p:stCondLst>
+                              <p:cond delay="0"/>
+                            </p:stCondLst>
+                            <p:childTnLst>
+                              <p:par>
+                                <p:cTn id="53" presetID="1" presetClass="entr" presetSubtype="0" fill="hold" nodeType="clickEffect">
+                                  <p:stCondLst>
+                                    <p:cond delay="0"/>
+                                  </p:stCondLst>
+                                  <p:childTnLst>
+                                    <p:set>
+                                      <p:cBhvr>
+                                        <p:cTn id="54" dur="1" fill="hold">
+                                          <p:stCondLst>
+                                            <p:cond delay="0"/>
+                                          </p:stCondLst>
+                                        </p:cTn>
+                                        <p:tgtEl>
+                                          <p:spTgt spid="4">
+                                            <p:txEl>
+                                              <p:pRg st="12" end="12"/>
+                                            </p:txEl>
+                                          </p:spTgt>
+                                        </p:tgtEl>
+                                        <p:attrNameLst>
+                                          <p:attrName>style.visibility</p:attrName>
+                                        </p:attrNameLst>
+                                      </p:cBhvr>
+                                      <p:to>
+                                        <p:strVal val="visible"/>
+                                      </p:to>
+                                    </p:set>
+                                  </p:childTnLst>
+                                </p:cTn>
+                              </p:par>
+                            </p:childTnLst>
+                          </p:cTn>
+                        </p:par>
+                      </p:childTnLst>
+                    </p:cTn>
+                  </p:par>
+                </p:childTnLst>
+              </p:cTn>
+              <p:prevCondLst>
+                <p:cond evt="onPrev" delay="0">
+                  <p:tgtEl>
+                    <p:sldTgt/>
+                  </p:tgtEl>
+                </p:cond>
+              </p:prevCondLst>
+              <p:nextCondLst>
+                <p:cond evt="onNext" delay="0">
+                  <p:tgtEl>
+                    <p:sldTgt/>
+                  </p:tgtEl>
+                </p:cond>
+              </p:nextCondLst>
+            </p:seq>
+          </p:childTnLst>
+        </p:cTn>
+      </p:par>
+    </p:tnLst>
+  </p:timing>
+</p:sld>
+</file>
+
+<file path=ppt/slides/slide21.xml><?xml version="1.0" encoding="utf-8"?>
+<p:sld xmlns:a="http://schemas.openxmlformats.org/drawingml/2006/main" xmlns:r="http://schemas.openxmlformats.org/officeDocument/2006/relationships" xmlns:p="http://schemas.openxmlformats.org/presentationml/2006/main">
+  <p:cSld>
+    <p:spTree>
+      <p:nvGrpSpPr>
+        <p:cNvPr id="1" name="">
+          <a:extLst>
+            <a:ext uri="{FF2B5EF4-FFF2-40B4-BE49-F238E27FC236}">
+              <a16:creationId xmlns:a16="http://schemas.microsoft.com/office/drawing/2014/main" id="{1685ECF7-8AE4-6131-D6C1-FE64BA698E1A}"/>
+            </a:ext>
+          </a:extLst>
+        </p:cNvPr>
+        <p:cNvGrpSpPr/>
+        <p:nvPr/>
+      </p:nvGrpSpPr>
+      <p:grpSpPr>
+        <a:xfrm>
+          <a:off x="0" y="0"/>
+          <a:ext cx="0" cy="0"/>
+          <a:chOff x="0" y="0"/>
+          <a:chExt cx="0" cy="0"/>
+        </a:xfrm>
+      </p:grpSpPr>
+      <p:sp>
+        <p:nvSpPr>
+          <p:cNvPr id="3" name="Subtitle 2">
+            <a:extLst>
+              <a:ext uri="{FF2B5EF4-FFF2-40B4-BE49-F238E27FC236}">
+                <a16:creationId xmlns:a16="http://schemas.microsoft.com/office/drawing/2014/main" id="{8C144EB9-2FCF-AF60-95EB-53EC00A5F371}"/>
+              </a:ext>
+            </a:extLst>
+          </p:cNvPr>
+          <p:cNvSpPr>
+            <a:spLocks noGrp="1"/>
+          </p:cNvSpPr>
+          <p:nvPr>
+            <p:ph type="subTitle" idx="1"/>
+          </p:nvPr>
+        </p:nvSpPr>
+        <p:spPr>
+          <a:xfrm>
+            <a:off x="152399" y="217488"/>
+            <a:ext cx="11223171" cy="303212"/>
+          </a:xfrm>
+        </p:spPr>
+        <p:txBody>
+          <a:bodyPr>
+            <a:normAutofit fontScale="92500" lnSpcReduction="20000"/>
+          </a:bodyPr>
+          <a:lstStyle/>
+          <a:p>
+            <a:r>
+              <a:rPr lang="en-US" sz="1800" b="1"/>
+              <a:t>Creating Abstract class – Extending an abstract class</a:t>
+            </a:r>
+          </a:p>
+        </p:txBody>
+      </p:sp>
+      <p:sp>
+        <p:nvSpPr>
+          <p:cNvPr id="4" name="Subtitle 2">
+            <a:extLst>
+              <a:ext uri="{FF2B5EF4-FFF2-40B4-BE49-F238E27FC236}">
+                <a16:creationId xmlns:a16="http://schemas.microsoft.com/office/drawing/2014/main" id="{28C86369-6F7A-BA88-BBD9-6061F2F1D067}"/>
+              </a:ext>
+            </a:extLst>
+          </p:cNvPr>
+          <p:cNvSpPr txBox="1">
+            <a:spLocks/>
+          </p:cNvSpPr>
+          <p:nvPr/>
+        </p:nvSpPr>
+        <p:spPr>
+          <a:xfrm>
+            <a:off x="0" y="820738"/>
+            <a:ext cx="12192000" cy="6037262"/>
+          </a:xfrm>
+          <a:prstGeom prst="rect">
+            <a:avLst/>
+          </a:prstGeom>
+        </p:spPr>
+        <p:txBody>
+          <a:bodyPr vert="horz" lIns="91440" tIns="45720" rIns="91440" bIns="45720" rtlCol="0">
+            <a:normAutofit/>
+          </a:bodyPr>
+          <a:lstStyle>
+            <a:lvl1pPr marL="0" indent="0" algn="ctr" defTabSz="914400" rtl="0" eaLnBrk="1" latinLnBrk="0" hangingPunct="1">
+              <a:lnSpc>
+                <a:spcPct val="90000"/>
+              </a:lnSpc>
+              <a:spcBef>
+                <a:spcPts val="1000"/>
+              </a:spcBef>
+              <a:buFont typeface="Arial" panose="020B0604020202020204" pitchFamily="34" charset="0"/>
+              <a:buNone/>
+              <a:defRPr sz="2400" kern="1200">
+                <a:solidFill>
+                  <a:schemeClr val="tx1"/>
+                </a:solidFill>
+                <a:latin typeface="+mn-lt"/>
+                <a:ea typeface="+mn-ea"/>
+                <a:cs typeface="+mn-cs"/>
+              </a:defRPr>
+            </a:lvl1pPr>
+            <a:lvl2pPr marL="457200" indent="0" algn="ctr" defTabSz="914400" rtl="0" eaLnBrk="1" latinLnBrk="0" hangingPunct="1">
+              <a:lnSpc>
+                <a:spcPct val="90000"/>
+              </a:lnSpc>
+              <a:spcBef>
+                <a:spcPts val="500"/>
+              </a:spcBef>
+              <a:buFont typeface="Arial" panose="020B0604020202020204" pitchFamily="34" charset="0"/>
+              <a:buNone/>
+              <a:defRPr sz="2000" kern="1200">
+                <a:solidFill>
+                  <a:schemeClr val="tx1"/>
+                </a:solidFill>
+                <a:latin typeface="+mn-lt"/>
+                <a:ea typeface="+mn-ea"/>
+                <a:cs typeface="+mn-cs"/>
+              </a:defRPr>
+            </a:lvl2pPr>
+            <a:lvl3pPr marL="914400" indent="0" algn="ctr" defTabSz="914400" rtl="0" eaLnBrk="1" latinLnBrk="0" hangingPunct="1">
+              <a:lnSpc>
+                <a:spcPct val="90000"/>
+              </a:lnSpc>
+              <a:spcBef>
+                <a:spcPts val="500"/>
+              </a:spcBef>
+              <a:buFont typeface="Arial" panose="020B0604020202020204" pitchFamily="34" charset="0"/>
+              <a:buNone/>
+              <a:defRPr sz="1800" kern="1200">
+                <a:solidFill>
+                  <a:schemeClr val="tx1"/>
+                </a:solidFill>
+                <a:latin typeface="+mn-lt"/>
+                <a:ea typeface="+mn-ea"/>
+                <a:cs typeface="+mn-cs"/>
+              </a:defRPr>
+            </a:lvl3pPr>
+            <a:lvl4pPr marL="1371600" indent="0" algn="ctr" defTabSz="914400" rtl="0" eaLnBrk="1" latinLnBrk="0" hangingPunct="1">
+              <a:lnSpc>
+                <a:spcPct val="90000"/>
+              </a:lnSpc>
+              <a:spcBef>
+                <a:spcPts val="500"/>
+              </a:spcBef>
+              <a:buFont typeface="Arial" panose="020B0604020202020204" pitchFamily="34" charset="0"/>
+              <a:buNone/>
+              <a:defRPr sz="1600" kern="1200">
+                <a:solidFill>
+                  <a:schemeClr val="tx1"/>
+                </a:solidFill>
+                <a:latin typeface="+mn-lt"/>
+                <a:ea typeface="+mn-ea"/>
+                <a:cs typeface="+mn-cs"/>
+              </a:defRPr>
+            </a:lvl4pPr>
+            <a:lvl5pPr marL="1828800" indent="0" algn="ctr" defTabSz="914400" rtl="0" eaLnBrk="1" latinLnBrk="0" hangingPunct="1">
+              <a:lnSpc>
+                <a:spcPct val="90000"/>
+              </a:lnSpc>
+              <a:spcBef>
+                <a:spcPts val="500"/>
+              </a:spcBef>
+              <a:buFont typeface="Arial" panose="020B0604020202020204" pitchFamily="34" charset="0"/>
+              <a:buNone/>
+              <a:defRPr sz="1600" kern="1200">
+                <a:solidFill>
+                  <a:schemeClr val="tx1"/>
+                </a:solidFill>
+                <a:latin typeface="+mn-lt"/>
+                <a:ea typeface="+mn-ea"/>
+                <a:cs typeface="+mn-cs"/>
+              </a:defRPr>
+            </a:lvl5pPr>
+            <a:lvl6pPr marL="2286000" indent="0" algn="ctr" defTabSz="914400" rtl="0" eaLnBrk="1" latinLnBrk="0" hangingPunct="1">
+              <a:lnSpc>
+                <a:spcPct val="90000"/>
+              </a:lnSpc>
+              <a:spcBef>
+                <a:spcPts val="500"/>
+              </a:spcBef>
+              <a:buFont typeface="Arial" panose="020B0604020202020204" pitchFamily="34" charset="0"/>
+              <a:buNone/>
+              <a:defRPr sz="1600" kern="1200">
+                <a:solidFill>
+                  <a:schemeClr val="tx1"/>
+                </a:solidFill>
+                <a:latin typeface="+mn-lt"/>
+                <a:ea typeface="+mn-ea"/>
+                <a:cs typeface="+mn-cs"/>
+              </a:defRPr>
+            </a:lvl6pPr>
+            <a:lvl7pPr marL="2743200" indent="0" algn="ctr" defTabSz="914400" rtl="0" eaLnBrk="1" latinLnBrk="0" hangingPunct="1">
+              <a:lnSpc>
+                <a:spcPct val="90000"/>
+              </a:lnSpc>
+              <a:spcBef>
+                <a:spcPts val="500"/>
+              </a:spcBef>
+              <a:buFont typeface="Arial" panose="020B0604020202020204" pitchFamily="34" charset="0"/>
+              <a:buNone/>
+              <a:defRPr sz="1600" kern="1200">
+                <a:solidFill>
+                  <a:schemeClr val="tx1"/>
+                </a:solidFill>
+                <a:latin typeface="+mn-lt"/>
+                <a:ea typeface="+mn-ea"/>
+                <a:cs typeface="+mn-cs"/>
+              </a:defRPr>
+            </a:lvl7pPr>
+            <a:lvl8pPr marL="3200400" indent="0" algn="ctr" defTabSz="914400" rtl="0" eaLnBrk="1" latinLnBrk="0" hangingPunct="1">
+              <a:lnSpc>
+                <a:spcPct val="90000"/>
+              </a:lnSpc>
+              <a:spcBef>
+                <a:spcPts val="500"/>
+              </a:spcBef>
+              <a:buFont typeface="Arial" panose="020B0604020202020204" pitchFamily="34" charset="0"/>
+              <a:buNone/>
+              <a:defRPr sz="1600" kern="1200">
+                <a:solidFill>
+                  <a:schemeClr val="tx1"/>
+                </a:solidFill>
+                <a:latin typeface="+mn-lt"/>
+                <a:ea typeface="+mn-ea"/>
+                <a:cs typeface="+mn-cs"/>
+              </a:defRPr>
+            </a:lvl8pPr>
+            <a:lvl9pPr marL="3657600" indent="0" algn="ctr" defTabSz="914400" rtl="0" eaLnBrk="1" latinLnBrk="0" hangingPunct="1">
+              <a:lnSpc>
+                <a:spcPct val="90000"/>
+              </a:lnSpc>
+              <a:spcBef>
+                <a:spcPts val="500"/>
+              </a:spcBef>
+              <a:buFont typeface="Arial" panose="020B0604020202020204" pitchFamily="34" charset="0"/>
+              <a:buNone/>
+              <a:defRPr sz="1600" kern="1200">
+                <a:solidFill>
+                  <a:schemeClr val="tx1"/>
+                </a:solidFill>
+                <a:latin typeface="+mn-lt"/>
+                <a:ea typeface="+mn-ea"/>
+                <a:cs typeface="+mn-cs"/>
+              </a:defRPr>
+            </a:lvl9pPr>
+          </a:lstStyle>
+          <a:p>
+            <a:pPr algn="l"/>
+            <a:r>
+              <a:rPr lang="en-US" sz="1800">
+                <a:sym typeface="Wingdings" pitchFamily="2" charset="2"/>
+              </a:rPr>
+              <a:t>- Rule for Abstract method: </a:t>
+            </a:r>
+          </a:p>
+          <a:p>
+            <a:pPr algn="l"/>
+            <a:r>
+              <a:rPr lang="en-US" sz="1800">
+                <a:sym typeface="Wingdings" pitchFamily="2" charset="2"/>
+              </a:rPr>
+              <a:t>+) ...</a:t>
+            </a:r>
+          </a:p>
+          <a:p>
+            <a:pPr algn="l"/>
+            <a:r>
+              <a:rPr lang="en-US" sz="1800">
+                <a:sym typeface="Wingdings" pitchFamily="2" charset="2"/>
+              </a:rPr>
+              <a:t>+) ... </a:t>
+            </a:r>
+          </a:p>
+          <a:p>
+            <a:pPr algn="l"/>
+            <a:r>
+              <a:rPr lang="en-US" sz="1800">
+                <a:sym typeface="Wingdings" pitchFamily="2" charset="2"/>
+              </a:rPr>
+              <a:t>+) ... </a:t>
+            </a:r>
+          </a:p>
+          <a:p>
+            <a:pPr algn="l"/>
+            <a:r>
+              <a:rPr lang="en-US" sz="1800">
+                <a:sym typeface="Wingdings" pitchFamily="2" charset="2"/>
+              </a:rPr>
+              <a:t>+) ... (ask question, Q6)</a:t>
+            </a:r>
+          </a:p>
+        </p:txBody>
+      </p:sp>
+    </p:spTree>
+    <p:extLst>
+      <p:ext uri="{BB962C8B-B14F-4D97-AF65-F5344CB8AC3E}">
+        <p14:creationId xmlns:p14="http://schemas.microsoft.com/office/powerpoint/2010/main" val="2694027537"/>
+      </p:ext>
+    </p:extLst>
+  </p:cSld>
+  <p:clrMapOvr>
+    <a:masterClrMapping/>
+  </p:clrMapOvr>
+  <p:timing>
+    <p:tnLst>
+      <p:par>
+        <p:cTn id="1" dur="indefinite" restart="never" nodeType="tmRoot">
+          <p:childTnLst>
+            <p:seq concurrent="1" nextAc="seek">
+              <p:cTn id="2" dur="indefinite" nodeType="mainSeq">
+                <p:childTnLst>
+                  <p:par>
+                    <p:cTn id="3" fill="hold">
+                      <p:stCondLst>
+                        <p:cond delay="indefinite"/>
+                      </p:stCondLst>
+                      <p:childTnLst>
+                        <p:par>
+                          <p:cTn id="4" fill="hold">
+                            <p:stCondLst>
+                              <p:cond delay="0"/>
+                            </p:stCondLst>
+                            <p:childTnLst>
+                              <p:par>
+                                <p:cTn id="5" presetID="1" presetClass="entr" presetSubtype="0" fill="hold" nodeType="clickEffect">
+                                  <p:stCondLst>
+                                    <p:cond delay="0"/>
+                                  </p:stCondLst>
+                                  <p:childTnLst>
+                                    <p:set>
+                                      <p:cBhvr>
+                                        <p:cTn id="6" dur="1" fill="hold">
+                                          <p:stCondLst>
+                                            <p:cond delay="0"/>
+                                          </p:stCondLst>
+                                        </p:cTn>
+                                        <p:tgtEl>
+                                          <p:spTgt spid="4">
+                                            <p:txEl>
+                                              <p:pRg st="0" end="0"/>
+                                            </p:txEl>
+                                          </p:spTgt>
+                                        </p:tgtEl>
+                                        <p:attrNameLst>
+                                          <p:attrName>style.visibility</p:attrName>
+                                        </p:attrNameLst>
+                                      </p:cBhvr>
+                                      <p:to>
+                                        <p:strVal val="visible"/>
+                                      </p:to>
+                                    </p:set>
+                                  </p:childTnLst>
+                                </p:cTn>
+                              </p:par>
+                            </p:childTnLst>
+                          </p:cTn>
+                        </p:par>
+                      </p:childTnLst>
+                    </p:cTn>
+                  </p:par>
+                  <p:par>
+                    <p:cTn id="7" fill="hold">
+                      <p:stCondLst>
+                        <p:cond delay="indefinite"/>
+                      </p:stCondLst>
+                      <p:childTnLst>
+                        <p:par>
+                          <p:cTn id="8" fill="hold">
+                            <p:stCondLst>
+                              <p:cond delay="0"/>
+                            </p:stCondLst>
+                            <p:childTnLst>
+                              <p:par>
+                                <p:cTn id="9" presetID="1" presetClass="entr" presetSubtype="0" fill="hold" nodeType="clickEffect">
+                                  <p:stCondLst>
+                                    <p:cond delay="0"/>
+                                  </p:stCondLst>
+                                  <p:childTnLst>
+                                    <p:set>
+                                      <p:cBhvr>
+                                        <p:cTn id="10" dur="1" fill="hold">
+                                          <p:stCondLst>
+                                            <p:cond delay="0"/>
+                                          </p:stCondLst>
+                                        </p:cTn>
+                                        <p:tgtEl>
+                                          <p:spTgt spid="4">
+                                            <p:txEl>
+                                              <p:pRg st="1" end="1"/>
+                                            </p:txEl>
+                                          </p:spTgt>
+                                        </p:tgtEl>
+                                        <p:attrNameLst>
+                                          <p:attrName>style.visibility</p:attrName>
+                                        </p:attrNameLst>
+                                      </p:cBhvr>
+                                      <p:to>
+                                        <p:strVal val="visible"/>
+                                      </p:to>
+                                    </p:set>
+                                  </p:childTnLst>
+                                </p:cTn>
+                              </p:par>
+                            </p:childTnLst>
+                          </p:cTn>
+                        </p:par>
+                      </p:childTnLst>
+                    </p:cTn>
+                  </p:par>
+                  <p:par>
+                    <p:cTn id="11" fill="hold">
+                      <p:stCondLst>
+                        <p:cond delay="indefinite"/>
+                      </p:stCondLst>
+                      <p:childTnLst>
+                        <p:par>
+                          <p:cTn id="12" fill="hold">
+                            <p:stCondLst>
+                              <p:cond delay="0"/>
+                            </p:stCondLst>
+                            <p:childTnLst>
+                              <p:par>
+                                <p:cTn id="13" presetID="1" presetClass="entr" presetSubtype="0" fill="hold" nodeType="clickEffect">
+                                  <p:stCondLst>
+                                    <p:cond delay="0"/>
+                                  </p:stCondLst>
+                                  <p:childTnLst>
+                                    <p:set>
+                                      <p:cBhvr>
+                                        <p:cTn id="14" dur="1" fill="hold">
+                                          <p:stCondLst>
+                                            <p:cond delay="0"/>
+                                          </p:stCondLst>
+                                        </p:cTn>
+                                        <p:tgtEl>
+                                          <p:spTgt spid="4">
+                                            <p:txEl>
+                                              <p:pRg st="2" end="2"/>
+                                            </p:txEl>
+                                          </p:spTgt>
+                                        </p:tgtEl>
+                                        <p:attrNameLst>
+                                          <p:attrName>style.visibility</p:attrName>
+                                        </p:attrNameLst>
+                                      </p:cBhvr>
+                                      <p:to>
+                                        <p:strVal val="visible"/>
+                                      </p:to>
+                                    </p:set>
+                                  </p:childTnLst>
+                                </p:cTn>
+                              </p:par>
+                            </p:childTnLst>
+                          </p:cTn>
+                        </p:par>
+                      </p:childTnLst>
+                    </p:cTn>
+                  </p:par>
+                  <p:par>
+                    <p:cTn id="15" fill="hold">
+                      <p:stCondLst>
+                        <p:cond delay="indefinite"/>
+                      </p:stCondLst>
+                      <p:childTnLst>
+                        <p:par>
+                          <p:cTn id="16" fill="hold">
+                            <p:stCondLst>
+                              <p:cond delay="0"/>
+                            </p:stCondLst>
+                            <p:childTnLst>
+                              <p:par>
+                                <p:cTn id="17" presetID="1" presetClass="entr" presetSubtype="0" fill="hold" nodeType="clickEffect">
+                                  <p:stCondLst>
+                                    <p:cond delay="0"/>
+                                  </p:stCondLst>
+                                  <p:childTnLst>
+                                    <p:set>
+                                      <p:cBhvr>
+                                        <p:cTn id="18" dur="1" fill="hold">
+                                          <p:stCondLst>
+                                            <p:cond delay="0"/>
+                                          </p:stCondLst>
+                                        </p:cTn>
+                                        <p:tgtEl>
+                                          <p:spTgt spid="4">
+                                            <p:txEl>
+                                              <p:pRg st="3" end="3"/>
+                                            </p:txEl>
+                                          </p:spTgt>
+                                        </p:tgtEl>
+                                        <p:attrNameLst>
+                                          <p:attrName>style.visibility</p:attrName>
+                                        </p:attrNameLst>
+                                      </p:cBhvr>
+                                      <p:to>
+                                        <p:strVal val="visible"/>
+                                      </p:to>
+                                    </p:set>
+                                  </p:childTnLst>
+                                </p:cTn>
+                              </p:par>
+                            </p:childTnLst>
+                          </p:cTn>
+                        </p:par>
+                      </p:childTnLst>
+                    </p:cTn>
+                  </p:par>
+                  <p:par>
+                    <p:cTn id="19" fill="hold">
+                      <p:stCondLst>
+                        <p:cond delay="indefinite"/>
+                      </p:stCondLst>
+                      <p:childTnLst>
+                        <p:par>
+                          <p:cTn id="20" fill="hold">
+                            <p:stCondLst>
+                              <p:cond delay="0"/>
+                            </p:stCondLst>
+                            <p:childTnLst>
+                              <p:par>
+                                <p:cTn id="21" presetID="1" presetClass="entr" presetSubtype="0" fill="hold" nodeType="clickEffect">
+                                  <p:stCondLst>
+                                    <p:cond delay="0"/>
+                                  </p:stCondLst>
+                                  <p:childTnLst>
+                                    <p:set>
+                                      <p:cBhvr>
+                                        <p:cTn id="22" dur="1" fill="hold">
+                                          <p:stCondLst>
+                                            <p:cond delay="0"/>
+                                          </p:stCondLst>
+                                        </p:cTn>
+                                        <p:tgtEl>
+                                          <p:spTgt spid="4">
+                                            <p:txEl>
+                                              <p:pRg st="4" end="4"/>
                                             </p:txEl>
                                           </p:spTgt>
                                         </p:tgtEl>

</xml_diff>

<commit_message>
1/2 chapter 5 presented
</commit_message>
<xml_diff>
--- a/self-study resources/J8SE1/Chapter 5 - Class Design.pptx
+++ b/self-study resources/J8SE1/Chapter 5 - Class Design.pptx
@@ -707,7 +707,7 @@
           </a:lstStyle>
           <a:p>
             <a:fld id="{9ACA2D73-2532-A640-A667-27AB4D0D333F}" type="datetimeFigureOut">
-              <a:t>3/12/24</a:t>
+              <a:t>4/12/24</a:t>
             </a:fld>
             <a:endParaRPr lang="en-VN"/>
           </a:p>
@@ -3254,7 +3254,7 @@
           <a:p>
             <a:fld id="{BAA8DE05-51EE-4692-B197-877FA1DAAAED}" type="datetimeFigureOut">
               <a:rPr lang="en-US" smtClean="0"/>
-              <a:t>12/3/24</a:t>
+              <a:t>12/4/24</a:t>
             </a:fld>
             <a:endParaRPr lang="en-US"/>
           </a:p>
@@ -3452,7 +3452,7 @@
           <a:p>
             <a:fld id="{BAA8DE05-51EE-4692-B197-877FA1DAAAED}" type="datetimeFigureOut">
               <a:rPr lang="en-US" smtClean="0"/>
-              <a:t>12/3/24</a:t>
+              <a:t>12/4/24</a:t>
             </a:fld>
             <a:endParaRPr lang="en-US"/>
           </a:p>
@@ -3660,7 +3660,7 @@
           <a:p>
             <a:fld id="{BAA8DE05-51EE-4692-B197-877FA1DAAAED}" type="datetimeFigureOut">
               <a:rPr lang="en-US" smtClean="0"/>
-              <a:t>12/3/24</a:t>
+              <a:t>12/4/24</a:t>
             </a:fld>
             <a:endParaRPr lang="en-US"/>
           </a:p>
@@ -3858,7 +3858,7 @@
           <a:p>
             <a:fld id="{BAA8DE05-51EE-4692-B197-877FA1DAAAED}" type="datetimeFigureOut">
               <a:rPr lang="en-US" smtClean="0"/>
-              <a:t>12/3/24</a:t>
+              <a:t>12/4/24</a:t>
             </a:fld>
             <a:endParaRPr lang="en-US"/>
           </a:p>
@@ -4133,7 +4133,7 @@
           <a:p>
             <a:fld id="{BAA8DE05-51EE-4692-B197-877FA1DAAAED}" type="datetimeFigureOut">
               <a:rPr lang="en-US" smtClean="0"/>
-              <a:t>12/3/24</a:t>
+              <a:t>12/4/24</a:t>
             </a:fld>
             <a:endParaRPr lang="en-US"/>
           </a:p>
@@ -4398,7 +4398,7 @@
           <a:p>
             <a:fld id="{BAA8DE05-51EE-4692-B197-877FA1DAAAED}" type="datetimeFigureOut">
               <a:rPr lang="en-US" smtClean="0"/>
-              <a:t>12/3/24</a:t>
+              <a:t>12/4/24</a:t>
             </a:fld>
             <a:endParaRPr lang="en-US"/>
           </a:p>
@@ -4810,7 +4810,7 @@
           <a:p>
             <a:fld id="{BAA8DE05-51EE-4692-B197-877FA1DAAAED}" type="datetimeFigureOut">
               <a:rPr lang="en-US" smtClean="0"/>
-              <a:t>12/3/24</a:t>
+              <a:t>12/4/24</a:t>
             </a:fld>
             <a:endParaRPr lang="en-US"/>
           </a:p>
@@ -4951,7 +4951,7 @@
           <a:p>
             <a:fld id="{BAA8DE05-51EE-4692-B197-877FA1DAAAED}" type="datetimeFigureOut">
               <a:rPr lang="en-US" smtClean="0"/>
-              <a:t>12/3/24</a:t>
+              <a:t>12/4/24</a:t>
             </a:fld>
             <a:endParaRPr lang="en-US"/>
           </a:p>
@@ -5064,7 +5064,7 @@
           <a:p>
             <a:fld id="{BAA8DE05-51EE-4692-B197-877FA1DAAAED}" type="datetimeFigureOut">
               <a:rPr lang="en-US" smtClean="0"/>
-              <a:t>12/3/24</a:t>
+              <a:t>12/4/24</a:t>
             </a:fld>
             <a:endParaRPr lang="en-US"/>
           </a:p>
@@ -5375,7 +5375,7 @@
           <a:p>
             <a:fld id="{BAA8DE05-51EE-4692-B197-877FA1DAAAED}" type="datetimeFigureOut">
               <a:rPr lang="en-US" smtClean="0"/>
-              <a:t>12/3/24</a:t>
+              <a:t>12/4/24</a:t>
             </a:fld>
             <a:endParaRPr lang="en-US"/>
           </a:p>
@@ -5663,7 +5663,7 @@
           <a:p>
             <a:fld id="{BAA8DE05-51EE-4692-B197-877FA1DAAAED}" type="datetimeFigureOut">
               <a:rPr lang="en-US" smtClean="0"/>
-              <a:t>12/3/24</a:t>
+              <a:t>12/4/24</a:t>
             </a:fld>
             <a:endParaRPr lang="en-US"/>
           </a:p>
@@ -5904,7 +5904,7 @@
           <a:p>
             <a:fld id="{BAA8DE05-51EE-4692-B197-877FA1DAAAED}" type="datetimeFigureOut">
               <a:rPr lang="en-US" smtClean="0"/>
-              <a:t>12/3/24</a:t>
+              <a:t>12/4/24</a:t>
             </a:fld>
             <a:endParaRPr lang="en-US"/>
           </a:p>
@@ -8345,7 +8345,7 @@
               <a:rPr lang="en-US" sz="1800">
                 <a:sym typeface="Wingdings" pitchFamily="2" charset="2"/>
               </a:rPr>
-              <a:t>- If the inherited field has a ... =&gt; We can refer to them ... or by using ... variable</a:t>
+              <a:t>- If the inherited field has a ... =&gt; We can refer to them ... or by using ... keyword</a:t>
             </a:r>
           </a:p>
           <a:p>

</xml_diff>